<commit_message>
added data pipe slides
</commit_message>
<xml_diff>
--- a/r_intro_researchers.pptx
+++ b/r_intro_researchers.pptx
@@ -5,7 +5,7 @@
     <p:sldMasterId id="2147483648" r:id="rId1"/>
   </p:sldMasterIdLst>
   <p:notesMasterIdLst>
-    <p:notesMasterId r:id="rId36"/>
+    <p:notesMasterId r:id="rId39"/>
   </p:notesMasterIdLst>
   <p:sldIdLst>
     <p:sldId id="263" r:id="rId2"/>
@@ -33,15 +33,18 @@
     <p:sldId id="311" r:id="rId24"/>
     <p:sldId id="312" r:id="rId25"/>
     <p:sldId id="304" r:id="rId26"/>
-    <p:sldId id="313" r:id="rId27"/>
-    <p:sldId id="315" r:id="rId28"/>
-    <p:sldId id="317" r:id="rId29"/>
-    <p:sldId id="318" r:id="rId30"/>
-    <p:sldId id="319" r:id="rId31"/>
-    <p:sldId id="320" r:id="rId32"/>
-    <p:sldId id="274" r:id="rId33"/>
-    <p:sldId id="275" r:id="rId34"/>
-    <p:sldId id="276" r:id="rId35"/>
+    <p:sldId id="321" r:id="rId27"/>
+    <p:sldId id="322" r:id="rId28"/>
+    <p:sldId id="323" r:id="rId29"/>
+    <p:sldId id="313" r:id="rId30"/>
+    <p:sldId id="315" r:id="rId31"/>
+    <p:sldId id="317" r:id="rId32"/>
+    <p:sldId id="318" r:id="rId33"/>
+    <p:sldId id="319" r:id="rId34"/>
+    <p:sldId id="320" r:id="rId35"/>
+    <p:sldId id="274" r:id="rId36"/>
+    <p:sldId id="275" r:id="rId37"/>
+    <p:sldId id="276" r:id="rId38"/>
   </p:sldIdLst>
   <p:sldSz cx="12192000" cy="6858000"/>
   <p:notesSz cx="6858000" cy="9144000"/>
@@ -288,7 +291,7 @@
           <a:p>
             <a:fld id="{0A9A628E-7277-4438-8DF0-5778D2FD5FD3}" type="datetimeFigureOut">
               <a:rPr lang="en-US" smtClean="0"/>
-              <a:t>9/24/2019</a:t>
+              <a:t>9/25/2019</a:t>
             </a:fld>
             <a:endParaRPr lang="en-US"/>
           </a:p>
@@ -620,7 +623,7 @@
           <a:p>
             <a:fld id="{19ABBB7F-C124-4C32-AE35-3236251552A4}" type="slidenum">
               <a:rPr lang="en-US" smtClean="0"/>
-              <a:t>29</a:t>
+              <a:t>32</a:t>
             </a:fld>
             <a:endParaRPr lang="en-US"/>
           </a:p>
@@ -704,7 +707,7 @@
           <a:p>
             <a:fld id="{19ABBB7F-C124-4C32-AE35-3236251552A4}" type="slidenum">
               <a:rPr lang="en-US" smtClean="0"/>
-              <a:t>33</a:t>
+              <a:t>36</a:t>
             </a:fld>
             <a:endParaRPr lang="en-US"/>
           </a:p>
@@ -870,7 +873,7 @@
           <a:p>
             <a:fld id="{2E9B9F13-826C-4D2E-B836-5B52099325F3}" type="datetimeFigureOut">
               <a:rPr lang="en-US" smtClean="0"/>
-              <a:t>9/24/2019</a:t>
+              <a:t>9/25/2019</a:t>
             </a:fld>
             <a:endParaRPr lang="en-US"/>
           </a:p>
@@ -1068,7 +1071,7 @@
           <a:p>
             <a:fld id="{2E9B9F13-826C-4D2E-B836-5B52099325F3}" type="datetimeFigureOut">
               <a:rPr lang="en-US" smtClean="0"/>
-              <a:t>9/24/2019</a:t>
+              <a:t>9/25/2019</a:t>
             </a:fld>
             <a:endParaRPr lang="en-US"/>
           </a:p>
@@ -1276,7 +1279,7 @@
           <a:p>
             <a:fld id="{2E9B9F13-826C-4D2E-B836-5B52099325F3}" type="datetimeFigureOut">
               <a:rPr lang="en-US" smtClean="0"/>
-              <a:t>9/24/2019</a:t>
+              <a:t>9/25/2019</a:t>
             </a:fld>
             <a:endParaRPr lang="en-US"/>
           </a:p>
@@ -1601,7 +1604,7 @@
             <a:fld id="{56ED6557-8EC6-45FC-B359-5D206E9600ED}" type="datetime1">
               <a:rPr lang="en-US" smtClean="0"/>
               <a:pPr/>
-              <a:t>9/24/2019</a:t>
+              <a:t>9/25/2019</a:t>
             </a:fld>
             <a:endParaRPr lang="en-US" dirty="0"/>
           </a:p>
@@ -1878,7 +1881,7 @@
           <a:p>
             <a:fld id="{2E9B9F13-826C-4D2E-B836-5B52099325F3}" type="datetimeFigureOut">
               <a:rPr lang="en-US" smtClean="0"/>
-              <a:t>9/24/2019</a:t>
+              <a:t>9/25/2019</a:t>
             </a:fld>
             <a:endParaRPr lang="en-US"/>
           </a:p>
@@ -2153,7 +2156,7 @@
           <a:p>
             <a:fld id="{2E9B9F13-826C-4D2E-B836-5B52099325F3}" type="datetimeFigureOut">
               <a:rPr lang="en-US" smtClean="0"/>
-              <a:t>9/24/2019</a:t>
+              <a:t>9/25/2019</a:t>
             </a:fld>
             <a:endParaRPr lang="en-US"/>
           </a:p>
@@ -2418,7 +2421,7 @@
           <a:p>
             <a:fld id="{2E9B9F13-826C-4D2E-B836-5B52099325F3}" type="datetimeFigureOut">
               <a:rPr lang="en-US" smtClean="0"/>
-              <a:t>9/24/2019</a:t>
+              <a:t>9/25/2019</a:t>
             </a:fld>
             <a:endParaRPr lang="en-US"/>
           </a:p>
@@ -2830,7 +2833,7 @@
           <a:p>
             <a:fld id="{2E9B9F13-826C-4D2E-B836-5B52099325F3}" type="datetimeFigureOut">
               <a:rPr lang="en-US" smtClean="0"/>
-              <a:t>9/24/2019</a:t>
+              <a:t>9/25/2019</a:t>
             </a:fld>
             <a:endParaRPr lang="en-US"/>
           </a:p>
@@ -2971,7 +2974,7 @@
           <a:p>
             <a:fld id="{2E9B9F13-826C-4D2E-B836-5B52099325F3}" type="datetimeFigureOut">
               <a:rPr lang="en-US" smtClean="0"/>
-              <a:t>9/24/2019</a:t>
+              <a:t>9/25/2019</a:t>
             </a:fld>
             <a:endParaRPr lang="en-US"/>
           </a:p>
@@ -3084,7 +3087,7 @@
           <a:p>
             <a:fld id="{2E9B9F13-826C-4D2E-B836-5B52099325F3}" type="datetimeFigureOut">
               <a:rPr lang="en-US" smtClean="0"/>
-              <a:t>9/24/2019</a:t>
+              <a:t>9/25/2019</a:t>
             </a:fld>
             <a:endParaRPr lang="en-US"/>
           </a:p>
@@ -3395,7 +3398,7 @@
           <a:p>
             <a:fld id="{2E9B9F13-826C-4D2E-B836-5B52099325F3}" type="datetimeFigureOut">
               <a:rPr lang="en-US" smtClean="0"/>
-              <a:t>9/24/2019</a:t>
+              <a:t>9/25/2019</a:t>
             </a:fld>
             <a:endParaRPr lang="en-US"/>
           </a:p>
@@ -3683,7 +3686,7 @@
           <a:p>
             <a:fld id="{2E9B9F13-826C-4D2E-B836-5B52099325F3}" type="datetimeFigureOut">
               <a:rPr lang="en-US" smtClean="0"/>
-              <a:t>9/24/2019</a:t>
+              <a:t>9/25/2019</a:t>
             </a:fld>
             <a:endParaRPr lang="en-US"/>
           </a:p>
@@ -3924,7 +3927,7 @@
           <a:p>
             <a:fld id="{2E9B9F13-826C-4D2E-B836-5B52099325F3}" type="datetimeFigureOut">
               <a:rPr lang="en-US" smtClean="0"/>
-              <a:t>9/24/2019</a:t>
+              <a:t>9/25/2019</a:t>
             </a:fld>
             <a:endParaRPr lang="en-US"/>
           </a:p>
@@ -4416,7 +4419,7 @@
                 </a:solidFill>
                 <a:latin typeface="+mj-lt"/>
               </a:rPr>
-              <a:t>September 24, 2019</a:t>
+              <a:t>September 25, 2019</a:t>
             </a:fld>
             <a:r>
               <a:rPr lang="en-CA" sz="1400" b="1" dirty="0">
@@ -4475,7 +4478,7 @@
                 <a:hlinkClick r:id="rId2">
                   <a:extLst>
                     <a:ext uri="{A12FA001-AC4F-418D-AE19-62706E023703}">
-                      <ahyp:hlinkClr xmlns:ahyp="http://schemas.microsoft.com/office/drawing/2018/hyperlinkcolor" val="tx"/>
+                      <ahyp:hlinkClr xmlns:ahyp="http://schemas.microsoft.com/office/drawing/2018/hyperlinkcolor" xmlns="" val="tx"/>
                     </a:ext>
                   </a:extLst>
                 </a:hlinkClick>
@@ -8650,9 +8653,10 @@
           <a:lstStyle/>
           <a:p>
             <a:r>
-              <a:rPr lang="en-CA" dirty="0"/>
-              <a:t>Regression</a:t>
-            </a:r>
+              <a:rPr lang="en-CA" dirty="0" smtClean="0"/>
+              <a:t>Data Pipe (%&gt;%)</a:t>
+            </a:r>
+            <a:endParaRPr lang="en-CA" dirty="0"/>
           </a:p>
         </p:txBody>
       </p:sp>
@@ -8669,291 +8673,94 @@
         <p:spPr/>
         <p:txBody>
           <a:bodyPr>
-            <a:normAutofit lnSpcReduction="10000"/>
+            <a:normAutofit/>
           </a:bodyPr>
           <a:lstStyle/>
           <a:p>
-            <a:r>
-              <a:rPr lang="en-CA" dirty="0"/>
-              <a:t>Multiple regressions: </a:t>
-            </a:r>
-            <a:r>
-              <a:rPr lang="en-CA" dirty="0">
-                <a:latin typeface="Consolas" panose="020B0609020204030204" pitchFamily="49" charset="0"/>
-                <a:hlinkClick r:id="rId2"/>
-              </a:rPr>
-              <a:t>lm()</a:t>
-            </a:r>
-            <a:r>
-              <a:rPr lang="en-CA" dirty="0"/>
-              <a:t> from </a:t>
-            </a:r>
-            <a:r>
-              <a:rPr lang="en-CA" dirty="0">
-                <a:latin typeface="Consolas" panose="020B0609020204030204" pitchFamily="49" charset="0"/>
-              </a:rPr>
-              <a:t>stats</a:t>
-            </a:r>
-            <a:r>
-              <a:rPr lang="en-CA" dirty="0"/>
-              <a:t> library in base R</a:t>
-            </a:r>
-          </a:p>
-          <a:p>
-            <a:pPr marL="0" indent="0" algn="ctr">
+            <a:pPr marL="0" indent="0">
               <a:buNone/>
             </a:pPr>
+            <a:r>
+              <a:rPr lang="en-CA" dirty="0" err="1">
+                <a:latin typeface="Consolas" panose="020B0609020204030204" pitchFamily="49" charset="0"/>
+              </a:rPr>
+              <a:t>iris_cleaned</a:t>
+            </a:r>
+            <a:r>
+              <a:rPr lang="en-CA" dirty="0">
+                <a:latin typeface="Consolas" panose="020B0609020204030204" pitchFamily="49" charset="0"/>
+              </a:rPr>
+              <a:t> &lt;- filter(iris, Species == "</a:t>
+            </a:r>
+            <a:r>
+              <a:rPr lang="en-CA" dirty="0" err="1">
+                <a:latin typeface="Consolas" panose="020B0609020204030204" pitchFamily="49" charset="0"/>
+              </a:rPr>
+              <a:t>setosa</a:t>
+            </a:r>
+            <a:r>
+              <a:rPr lang="en-CA" dirty="0" smtClean="0">
+                <a:latin typeface="Consolas" panose="020B0609020204030204" pitchFamily="49" charset="0"/>
+              </a:rPr>
+              <a:t>")</a:t>
+            </a:r>
+          </a:p>
+          <a:p>
+            <a:pPr marL="0" indent="0">
+              <a:buNone/>
+            </a:pPr>
+            <a:r>
+              <a:rPr lang="en-CA" dirty="0" err="1" smtClean="0">
+                <a:latin typeface="Consolas" panose="020B0609020204030204" pitchFamily="49" charset="0"/>
+              </a:rPr>
+              <a:t>iris_cleaned</a:t>
+            </a:r>
+            <a:r>
+              <a:rPr lang="en-CA" dirty="0" smtClean="0">
+                <a:latin typeface="Consolas" panose="020B0609020204030204" pitchFamily="49" charset="0"/>
+              </a:rPr>
+              <a:t> </a:t>
+            </a:r>
+            <a:r>
+              <a:rPr lang="en-CA" dirty="0">
+                <a:latin typeface="Consolas" panose="020B0609020204030204" pitchFamily="49" charset="0"/>
+              </a:rPr>
+              <a:t>&lt;- select(</a:t>
+            </a:r>
+            <a:r>
+              <a:rPr lang="en-CA" dirty="0" err="1">
+                <a:latin typeface="Consolas" panose="020B0609020204030204" pitchFamily="49" charset="0"/>
+              </a:rPr>
+              <a:t>iris_cleaned</a:t>
+            </a:r>
+            <a:r>
+              <a:rPr lang="en-CA" dirty="0">
+                <a:latin typeface="Consolas" panose="020B0609020204030204" pitchFamily="49" charset="0"/>
+              </a:rPr>
+              <a:t>, </a:t>
+            </a:r>
+            <a:r>
+              <a:rPr lang="en-CA" dirty="0" err="1">
+                <a:latin typeface="Consolas" panose="020B0609020204030204" pitchFamily="49" charset="0"/>
+              </a:rPr>
+              <a:t>Sepal.Length</a:t>
+            </a:r>
+            <a:r>
+              <a:rPr lang="en-CA" dirty="0" smtClean="0">
+                <a:latin typeface="Consolas" panose="020B0609020204030204" pitchFamily="49" charset="0"/>
+              </a:rPr>
+              <a:t>)</a:t>
+            </a:r>
             <a:endParaRPr lang="en-CA" dirty="0">
               <a:latin typeface="Consolas" panose="020B0609020204030204" pitchFamily="49" charset="0"/>
             </a:endParaRPr>
           </a:p>
-          <a:p>
-            <a:pPr marL="0" indent="0" algn="ctr">
-              <a:buNone/>
-            </a:pPr>
-            <a:r>
-              <a:rPr lang="en-CA" dirty="0" err="1">
-                <a:latin typeface="Consolas" panose="020B0609020204030204" pitchFamily="49" charset="0"/>
-              </a:rPr>
-              <a:t>my_model</a:t>
-            </a:r>
-            <a:r>
-              <a:rPr lang="en-CA" dirty="0">
-                <a:latin typeface="Consolas" panose="020B0609020204030204" pitchFamily="49" charset="0"/>
-              </a:rPr>
-              <a:t> &lt;- lm(y ~ x1 + x2, data)</a:t>
-            </a:r>
-          </a:p>
-          <a:p>
-            <a:endParaRPr lang="en-CA" dirty="0"/>
-          </a:p>
-          <a:p>
-            <a:r>
-              <a:rPr lang="en-CA" dirty="0"/>
-              <a:t>IV regressions: </a:t>
-            </a:r>
-            <a:r>
-              <a:rPr lang="en-CA" dirty="0" err="1">
-                <a:latin typeface="Consolas" panose="020B0609020204030204" pitchFamily="49" charset="0"/>
-                <a:hlinkClick r:id="rId3"/>
-              </a:rPr>
-              <a:t>ivreg</a:t>
-            </a:r>
-            <a:r>
-              <a:rPr lang="en-CA" dirty="0">
-                <a:latin typeface="Consolas" panose="020B0609020204030204" pitchFamily="49" charset="0"/>
-                <a:hlinkClick r:id="rId3"/>
-              </a:rPr>
-              <a:t>()</a:t>
-            </a:r>
-            <a:r>
-              <a:rPr lang="en-CA" dirty="0"/>
-              <a:t> from </a:t>
-            </a:r>
-            <a:r>
-              <a:rPr lang="en-CA" dirty="0">
-                <a:latin typeface="Consolas" panose="020B0609020204030204" pitchFamily="49" charset="0"/>
-                <a:hlinkClick r:id="rId4"/>
-              </a:rPr>
-              <a:t>AER</a:t>
-            </a:r>
-            <a:r>
-              <a:rPr lang="en-CA" dirty="0"/>
-              <a:t> library</a:t>
-            </a:r>
-          </a:p>
-          <a:p>
-            <a:endParaRPr lang="en-CA" dirty="0"/>
-          </a:p>
-          <a:p>
-            <a:pPr marL="0" indent="0" algn="ctr">
-              <a:buNone/>
-            </a:pPr>
-            <a:r>
-              <a:rPr lang="en-CA" dirty="0" err="1">
-                <a:latin typeface="Consolas" panose="020B0609020204030204" pitchFamily="49" charset="0"/>
-              </a:rPr>
-              <a:t>my_iv_model</a:t>
-            </a:r>
-            <a:r>
-              <a:rPr lang="en-CA" dirty="0">
-                <a:latin typeface="Consolas" panose="020B0609020204030204" pitchFamily="49" charset="0"/>
-              </a:rPr>
-              <a:t> &lt;- </a:t>
-            </a:r>
-            <a:r>
-              <a:rPr lang="en-CA" dirty="0" err="1">
-                <a:latin typeface="Consolas" panose="020B0609020204030204" pitchFamily="49" charset="0"/>
-              </a:rPr>
-              <a:t>ivreg</a:t>
-            </a:r>
-            <a:r>
-              <a:rPr lang="en-CA" dirty="0">
-                <a:latin typeface="Consolas" panose="020B0609020204030204" pitchFamily="49" charset="0"/>
-              </a:rPr>
-              <a:t>(y ~ x + w | w + z, data)</a:t>
-            </a:r>
-          </a:p>
-          <a:p>
-            <a:endParaRPr lang="en-CA" dirty="0">
-              <a:latin typeface="Consolas" panose="020B0609020204030204" pitchFamily="49" charset="0"/>
-            </a:endParaRPr>
-          </a:p>
-          <a:p>
-            <a:r>
-              <a:rPr lang="en-CA" dirty="0"/>
-              <a:t>Regression result summary: </a:t>
-            </a:r>
-            <a:r>
-              <a:rPr lang="en-CA" dirty="0">
-                <a:latin typeface="Consolas" panose="020B0609020204030204" pitchFamily="49" charset="0"/>
-              </a:rPr>
-              <a:t>summary()</a:t>
-            </a:r>
-          </a:p>
-        </p:txBody>
-      </p:sp>
-      <p:sp>
-        <p:nvSpPr>
-          <p:cNvPr id="4" name="TextBox 3"/>
-          <p:cNvSpPr txBox="1"/>
-          <p:nvPr/>
-        </p:nvSpPr>
-        <p:spPr>
-          <a:xfrm>
-            <a:off x="6152140" y="4989095"/>
-            <a:ext cx="1096454" cy="307777"/>
-          </a:xfrm>
-          <a:prstGeom prst="rect">
-            <a:avLst/>
-          </a:prstGeom>
-          <a:noFill/>
-        </p:spPr>
-        <p:txBody>
-          <a:bodyPr wrap="none" rtlCol="0">
-            <a:spAutoFit/>
-          </a:bodyPr>
-          <a:lstStyle/>
-          <a:p>
-            <a:r>
-              <a:rPr lang="en-CA" sz="1400" b="1" dirty="0">
-                <a:solidFill>
-                  <a:srgbClr val="FF0000"/>
-                </a:solidFill>
-              </a:rPr>
-              <a:t>endogenous</a:t>
-            </a:r>
-          </a:p>
-        </p:txBody>
-      </p:sp>
-      <p:sp>
-        <p:nvSpPr>
-          <p:cNvPr id="5" name="TextBox 4"/>
-          <p:cNvSpPr txBox="1"/>
-          <p:nvPr/>
-        </p:nvSpPr>
-        <p:spPr>
-          <a:xfrm>
-            <a:off x="6978308" y="4301508"/>
-            <a:ext cx="978922" cy="307777"/>
-          </a:xfrm>
-          <a:prstGeom prst="rect">
-            <a:avLst/>
-          </a:prstGeom>
-          <a:noFill/>
-        </p:spPr>
-        <p:txBody>
-          <a:bodyPr wrap="none" rtlCol="0">
-            <a:spAutoFit/>
-          </a:bodyPr>
-          <a:lstStyle/>
-          <a:p>
-            <a:r>
-              <a:rPr lang="en-CA" sz="1400" b="1" dirty="0"/>
-              <a:t>exogenous</a:t>
-            </a:r>
-          </a:p>
-        </p:txBody>
-      </p:sp>
-      <p:sp>
-        <p:nvSpPr>
-          <p:cNvPr id="10" name="TextBox 9"/>
-          <p:cNvSpPr txBox="1"/>
-          <p:nvPr/>
-        </p:nvSpPr>
-        <p:spPr>
-          <a:xfrm>
-            <a:off x="8554705" y="4983298"/>
-            <a:ext cx="1011367" cy="307777"/>
-          </a:xfrm>
-          <a:prstGeom prst="rect">
-            <a:avLst/>
-          </a:prstGeom>
-          <a:noFill/>
-        </p:spPr>
-        <p:txBody>
-          <a:bodyPr wrap="none" rtlCol="0">
-            <a:spAutoFit/>
-          </a:bodyPr>
-          <a:lstStyle/>
-          <a:p>
-            <a:r>
-              <a:rPr lang="en-CA" sz="1400" b="1" dirty="0">
-                <a:solidFill>
-                  <a:srgbClr val="FF0000"/>
-                </a:solidFill>
-              </a:rPr>
-              <a:t>instrument</a:t>
-            </a:r>
-          </a:p>
-        </p:txBody>
-      </p:sp>
-      <p:sp>
-        <p:nvSpPr>
-          <p:cNvPr id="11" name="TextBox 10">
-            <a:extLst>
-              <a:ext uri="{FF2B5EF4-FFF2-40B4-BE49-F238E27FC236}">
-                <a16:creationId xmlns:a16="http://schemas.microsoft.com/office/drawing/2014/main" id="{116C3521-D943-44B3-A3CD-E9BD9D31B3A6}"/>
-              </a:ext>
-            </a:extLst>
-          </p:cNvPr>
-          <p:cNvSpPr txBox="1"/>
-          <p:nvPr/>
-        </p:nvSpPr>
-        <p:spPr>
-          <a:xfrm>
-            <a:off x="865391" y="6123543"/>
-            <a:ext cx="6308918" cy="369332"/>
-          </a:xfrm>
-          <a:prstGeom prst="rect">
-            <a:avLst/>
-          </a:prstGeom>
-          <a:noFill/>
-        </p:spPr>
-        <p:txBody>
-          <a:bodyPr wrap="square" rtlCol="0">
-            <a:spAutoFit/>
-          </a:bodyPr>
-          <a:lstStyle/>
-          <a:p>
-            <a:r>
-              <a:rPr lang="en-US" dirty="0"/>
-              <a:t>Ref. </a:t>
-            </a:r>
-            <a:r>
-              <a:rPr lang="en-US" dirty="0">
-                <a:hlinkClick r:id="rId5"/>
-              </a:rPr>
-              <a:t>https://rpubs.com/wsundstrom/t_ivreg</a:t>
-            </a:r>
-            <a:endParaRPr lang="en-US" dirty="0"/>
-          </a:p>
         </p:txBody>
       </p:sp>
     </p:spTree>
     <p:extLst>
       <p:ext uri="{BB962C8B-B14F-4D97-AF65-F5344CB8AC3E}">
-        <p14:creationId xmlns:p14="http://schemas.microsoft.com/office/powerpoint/2010/main" val="2855024186"/>
+        <p14:creationId xmlns:p14="http://schemas.microsoft.com/office/powerpoint/2010/main" val="32351930"/>
       </p:ext>
     </p:extLst>
   </p:cSld>
@@ -8996,9 +8803,10 @@
           <a:lstStyle/>
           <a:p>
             <a:r>
-              <a:rPr lang="en-CA" dirty="0"/>
-              <a:t>Report</a:t>
-            </a:r>
+              <a:rPr lang="en-CA" dirty="0" smtClean="0"/>
+              <a:t>Data Pipe (%&gt;%)</a:t>
+            </a:r>
+            <a:endParaRPr lang="en-CA" dirty="0"/>
           </a:p>
         </p:txBody>
       </p:sp>
@@ -9014,182 +8822,208 @@
         </p:nvSpPr>
         <p:spPr/>
         <p:txBody>
-          <a:bodyPr/>
-          <a:lstStyle/>
-          <a:p>
-            <a:r>
-              <a:rPr lang="en-CA" dirty="0"/>
-              <a:t>Summary table</a:t>
-            </a:r>
-          </a:p>
-          <a:p>
-            <a:pPr lvl="1"/>
-            <a:r>
-              <a:rPr lang="en-CA" dirty="0">
-                <a:hlinkClick r:id="rId2"/>
-              </a:rPr>
-              <a:t>Summary for lm()</a:t>
-            </a:r>
-            <a:r>
-              <a:rPr lang="en-CA" dirty="0"/>
-              <a:t>:</a:t>
-            </a:r>
-            <a:r>
-              <a:rPr lang="en-CA" dirty="0">
-                <a:latin typeface="Consolas" panose="020B0609020204030204" pitchFamily="49" charset="0"/>
-              </a:rPr>
-              <a:t> summary(</a:t>
-            </a:r>
-            <a:r>
-              <a:rPr lang="en-CA" dirty="0" err="1">
-                <a:latin typeface="Consolas" panose="020B0609020204030204" pitchFamily="49" charset="0"/>
-              </a:rPr>
-              <a:t>my_model</a:t>
-            </a:r>
-            <a:r>
-              <a:rPr lang="en-CA" dirty="0">
-                <a:latin typeface="Consolas" panose="020B0609020204030204" pitchFamily="49" charset="0"/>
-              </a:rPr>
-              <a:t>)</a:t>
-            </a:r>
-          </a:p>
-          <a:p>
-            <a:pPr lvl="1"/>
-            <a:r>
-              <a:rPr lang="en-CA" dirty="0">
-                <a:hlinkClick r:id="rId3"/>
-              </a:rPr>
-              <a:t>Summary for </a:t>
-            </a:r>
-            <a:r>
-              <a:rPr lang="en-CA" dirty="0" err="1">
-                <a:hlinkClick r:id="rId3"/>
-              </a:rPr>
-              <a:t>ivreg</a:t>
-            </a:r>
-            <a:r>
-              <a:rPr lang="en-CA" dirty="0">
-                <a:hlinkClick r:id="rId3"/>
-              </a:rPr>
-              <a:t>()</a:t>
-            </a:r>
-            <a:r>
-              <a:rPr lang="en-CA" dirty="0"/>
-              <a:t>:</a:t>
-            </a:r>
-            <a:r>
-              <a:rPr lang="en-CA" dirty="0">
-                <a:latin typeface="Consolas" panose="020B0609020204030204" pitchFamily="49" charset="0"/>
-              </a:rPr>
-              <a:t> summary(</a:t>
-            </a:r>
-            <a:r>
-              <a:rPr lang="en-CA" dirty="0" err="1">
-                <a:latin typeface="Consolas" panose="020B0609020204030204" pitchFamily="49" charset="0"/>
-              </a:rPr>
-              <a:t>my_iv_model</a:t>
-            </a:r>
-            <a:r>
-              <a:rPr lang="en-CA" dirty="0">
-                <a:latin typeface="Consolas" panose="020B0609020204030204" pitchFamily="49" charset="0"/>
-              </a:rPr>
-              <a:t>)</a:t>
-            </a:r>
-            <a:endParaRPr lang="en-CA" dirty="0"/>
-          </a:p>
-          <a:p>
-            <a:endParaRPr lang="en-CA" dirty="0"/>
-          </a:p>
-          <a:p>
-            <a:r>
-              <a:rPr lang="en-CA" dirty="0"/>
-              <a:t>publication-ready table: </a:t>
-            </a:r>
-            <a:r>
-              <a:rPr lang="en-CA" dirty="0">
-                <a:latin typeface="Consolas" panose="020B0609020204030204" pitchFamily="49" charset="0"/>
-                <a:hlinkClick r:id="rId4"/>
-              </a:rPr>
-              <a:t>stargazer()</a:t>
-            </a:r>
-            <a:r>
-              <a:rPr lang="en-CA" dirty="0"/>
-              <a:t> from </a:t>
-            </a:r>
-            <a:r>
-              <a:rPr lang="en-CA" dirty="0">
-                <a:latin typeface="Consolas" panose="020B0609020204030204" pitchFamily="49" charset="0"/>
-                <a:hlinkClick r:id="rId5"/>
-              </a:rPr>
-              <a:t>stargazer</a:t>
-            </a:r>
-            <a:r>
-              <a:rPr lang="en-CA" dirty="0"/>
-              <a:t> library</a:t>
-            </a:r>
-          </a:p>
-          <a:p>
-            <a:endParaRPr lang="en-CA" dirty="0"/>
-          </a:p>
-          <a:p>
-            <a:pPr marL="0" indent="0" algn="ctr">
+          <a:bodyPr>
+            <a:normAutofit/>
+          </a:bodyPr>
+          <a:lstStyle/>
+          <a:p>
+            <a:pPr marL="0" indent="0">
               <a:buNone/>
             </a:pPr>
             <a:r>
+              <a:rPr lang="en-CA" dirty="0" err="1">
+                <a:latin typeface="Consolas" panose="020B0609020204030204" pitchFamily="49" charset="0"/>
+              </a:rPr>
+              <a:t>iris_cleaned</a:t>
+            </a:r>
+            <a:r>
               <a:rPr lang="en-CA" dirty="0">
                 <a:latin typeface="Consolas" panose="020B0609020204030204" pitchFamily="49" charset="0"/>
               </a:rPr>
-              <a:t>stargazer(my_model1, my_model2, …)</a:t>
-            </a:r>
-          </a:p>
-        </p:txBody>
-      </p:sp>
-      <p:sp>
-        <p:nvSpPr>
-          <p:cNvPr id="4" name="TextBox 3">
-            <a:extLst>
-              <a:ext uri="{FF2B5EF4-FFF2-40B4-BE49-F238E27FC236}">
-                <a16:creationId xmlns:a16="http://schemas.microsoft.com/office/drawing/2014/main" id="{116C3521-D943-44B3-A3CD-E9BD9D31B3A6}"/>
-              </a:ext>
-            </a:extLst>
-          </p:cNvPr>
-          <p:cNvSpPr txBox="1"/>
-          <p:nvPr/>
-        </p:nvSpPr>
-        <p:spPr>
-          <a:xfrm>
-            <a:off x="865391" y="6123543"/>
-            <a:ext cx="8591430" cy="369332"/>
-          </a:xfrm>
-          <a:prstGeom prst="rect">
-            <a:avLst/>
-          </a:prstGeom>
-          <a:noFill/>
-        </p:spPr>
-        <p:txBody>
-          <a:bodyPr wrap="square" rtlCol="0">
-            <a:spAutoFit/>
-          </a:bodyPr>
-          <a:lstStyle/>
-          <a:p>
-            <a:r>
-              <a:rPr lang="en-US" dirty="0"/>
-              <a:t>Ref. </a:t>
-            </a:r>
-            <a:r>
-              <a:rPr lang="en-US" dirty="0">
-                <a:hlinkClick r:id="rId6"/>
-              </a:rPr>
-              <a:t>https://cran.r-project.org/web/packages/stargazer/vignettes/stargazer.pdf</a:t>
-            </a:r>
-            <a:endParaRPr lang="en-US" dirty="0"/>
+              <a:t> &lt;- filter(iris, Species == "</a:t>
+            </a:r>
+            <a:r>
+              <a:rPr lang="en-CA" dirty="0" err="1">
+                <a:latin typeface="Consolas" panose="020B0609020204030204" pitchFamily="49" charset="0"/>
+              </a:rPr>
+              <a:t>setosa</a:t>
+            </a:r>
+            <a:r>
+              <a:rPr lang="en-CA" dirty="0">
+                <a:latin typeface="Consolas" panose="020B0609020204030204" pitchFamily="49" charset="0"/>
+              </a:rPr>
+              <a:t>")</a:t>
+            </a:r>
+          </a:p>
+          <a:p>
+            <a:pPr marL="0" indent="0">
+              <a:buNone/>
+            </a:pPr>
+            <a:r>
+              <a:rPr lang="en-CA" dirty="0" err="1">
+                <a:latin typeface="Consolas" panose="020B0609020204030204" pitchFamily="49" charset="0"/>
+              </a:rPr>
+              <a:t>iris_cleaned</a:t>
+            </a:r>
+            <a:r>
+              <a:rPr lang="en-CA" dirty="0">
+                <a:latin typeface="Consolas" panose="020B0609020204030204" pitchFamily="49" charset="0"/>
+              </a:rPr>
+              <a:t> &lt;- select(</a:t>
+            </a:r>
+            <a:r>
+              <a:rPr lang="en-CA" dirty="0" err="1">
+                <a:latin typeface="Consolas" panose="020B0609020204030204" pitchFamily="49" charset="0"/>
+              </a:rPr>
+              <a:t>iris_cleaned</a:t>
+            </a:r>
+            <a:r>
+              <a:rPr lang="en-CA" dirty="0">
+                <a:latin typeface="Consolas" panose="020B0609020204030204" pitchFamily="49" charset="0"/>
+              </a:rPr>
+              <a:t>, </a:t>
+            </a:r>
+            <a:r>
+              <a:rPr lang="en-CA" dirty="0" err="1">
+                <a:latin typeface="Consolas" panose="020B0609020204030204" pitchFamily="49" charset="0"/>
+              </a:rPr>
+              <a:t>Sepal.Length</a:t>
+            </a:r>
+            <a:r>
+              <a:rPr lang="en-CA" dirty="0">
+                <a:latin typeface="Consolas" panose="020B0609020204030204" pitchFamily="49" charset="0"/>
+              </a:rPr>
+              <a:t>)</a:t>
+            </a:r>
+          </a:p>
+          <a:p>
+            <a:pPr marL="0" indent="0">
+              <a:buNone/>
+            </a:pPr>
+            <a:endParaRPr lang="en-CA" dirty="0">
+              <a:latin typeface="Consolas" panose="020B0609020204030204" pitchFamily="49" charset="0"/>
+            </a:endParaRPr>
+          </a:p>
+          <a:p>
+            <a:pPr marL="0" indent="0">
+              <a:buNone/>
+            </a:pPr>
+            <a:r>
+              <a:rPr lang="en-CA" dirty="0" err="1">
+                <a:latin typeface="Consolas" panose="020B0609020204030204" pitchFamily="49" charset="0"/>
+              </a:rPr>
+              <a:t>iris_cleaned</a:t>
+            </a:r>
+            <a:r>
+              <a:rPr lang="en-CA" dirty="0">
+                <a:latin typeface="Consolas" panose="020B0609020204030204" pitchFamily="49" charset="0"/>
+              </a:rPr>
+              <a:t> &lt;- iris </a:t>
+            </a:r>
+            <a:r>
+              <a:rPr lang="en-CA" b="1" dirty="0">
+                <a:solidFill>
+                  <a:srgbClr val="FF0000"/>
+                </a:solidFill>
+                <a:latin typeface="Consolas" panose="020B0609020204030204" pitchFamily="49" charset="0"/>
+              </a:rPr>
+              <a:t>%&gt;%</a:t>
+            </a:r>
+          </a:p>
+          <a:p>
+            <a:pPr marL="0" indent="0">
+              <a:buNone/>
+            </a:pPr>
+            <a:r>
+              <a:rPr lang="en-CA" dirty="0">
+                <a:latin typeface="Consolas" panose="020B0609020204030204" pitchFamily="49" charset="0"/>
+              </a:rPr>
+              <a:t>  filter(</a:t>
+            </a:r>
+            <a:r>
+              <a:rPr lang="en-CA" b="1" dirty="0">
+                <a:solidFill>
+                  <a:srgbClr val="FF0000"/>
+                </a:solidFill>
+                <a:latin typeface="Consolas" panose="020B0609020204030204" pitchFamily="49" charset="0"/>
+              </a:rPr>
+              <a:t>.</a:t>
+            </a:r>
+            <a:r>
+              <a:rPr lang="en-CA" dirty="0">
+                <a:latin typeface="Consolas" panose="020B0609020204030204" pitchFamily="49" charset="0"/>
+              </a:rPr>
+              <a:t>, Species == "</a:t>
+            </a:r>
+            <a:r>
+              <a:rPr lang="en-CA" dirty="0" err="1">
+                <a:latin typeface="Consolas" panose="020B0609020204030204" pitchFamily="49" charset="0"/>
+              </a:rPr>
+              <a:t>setosa</a:t>
+            </a:r>
+            <a:r>
+              <a:rPr lang="en-CA" dirty="0">
+                <a:latin typeface="Consolas" panose="020B0609020204030204" pitchFamily="49" charset="0"/>
+              </a:rPr>
+              <a:t>") </a:t>
+            </a:r>
+            <a:r>
+              <a:rPr lang="en-CA" b="1" dirty="0">
+                <a:solidFill>
+                  <a:srgbClr val="FF0000"/>
+                </a:solidFill>
+                <a:latin typeface="Consolas" panose="020B0609020204030204" pitchFamily="49" charset="0"/>
+              </a:rPr>
+              <a:t>%&gt;%</a:t>
+            </a:r>
+          </a:p>
+          <a:p>
+            <a:pPr marL="0" indent="0">
+              <a:buNone/>
+            </a:pPr>
+            <a:r>
+              <a:rPr lang="en-CA" dirty="0">
+                <a:latin typeface="Consolas" panose="020B0609020204030204" pitchFamily="49" charset="0"/>
+              </a:rPr>
+              <a:t>  select(</a:t>
+            </a:r>
+            <a:r>
+              <a:rPr lang="en-CA" b="1" dirty="0">
+                <a:solidFill>
+                  <a:srgbClr val="FF0000"/>
+                </a:solidFill>
+                <a:latin typeface="Consolas" panose="020B0609020204030204" pitchFamily="49" charset="0"/>
+              </a:rPr>
+              <a:t>.</a:t>
+            </a:r>
+            <a:r>
+              <a:rPr lang="en-CA" dirty="0">
+                <a:latin typeface="Consolas" panose="020B0609020204030204" pitchFamily="49" charset="0"/>
+              </a:rPr>
+              <a:t>, </a:t>
+            </a:r>
+            <a:r>
+              <a:rPr lang="en-CA" dirty="0" err="1">
+                <a:latin typeface="Consolas" panose="020B0609020204030204" pitchFamily="49" charset="0"/>
+              </a:rPr>
+              <a:t>Sepal.Length</a:t>
+            </a:r>
+            <a:r>
+              <a:rPr lang="en-CA" dirty="0" smtClean="0">
+                <a:latin typeface="Consolas" panose="020B0609020204030204" pitchFamily="49" charset="0"/>
+              </a:rPr>
+              <a:t>)</a:t>
+            </a:r>
+            <a:endParaRPr lang="en-CA" dirty="0">
+              <a:latin typeface="Consolas" panose="020B0609020204030204" pitchFamily="49" charset="0"/>
+            </a:endParaRPr>
           </a:p>
         </p:txBody>
       </p:sp>
     </p:spTree>
     <p:extLst>
       <p:ext uri="{BB962C8B-B14F-4D97-AF65-F5344CB8AC3E}">
-        <p14:creationId xmlns:p14="http://schemas.microsoft.com/office/powerpoint/2010/main" val="241107658"/>
+        <p14:creationId xmlns:p14="http://schemas.microsoft.com/office/powerpoint/2010/main" val="3290167153"/>
       </p:ext>
     </p:extLst>
   </p:cSld>
@@ -9218,13 +9052,7 @@
       </p:grpSpPr>
       <p:sp>
         <p:nvSpPr>
-          <p:cNvPr id="2" name="Title 1">
-            <a:extLst>
-              <a:ext uri="{FF2B5EF4-FFF2-40B4-BE49-F238E27FC236}">
-                <a16:creationId xmlns:a16="http://schemas.microsoft.com/office/drawing/2014/main" id="{7BA64387-4D68-4B6B-8A38-128610E12111}"/>
-              </a:ext>
-            </a:extLst>
-          </p:cNvPr>
+          <p:cNvPr id="2" name="Title 1"/>
           <p:cNvSpPr>
             <a:spLocks noGrp="1"/>
           </p:cNvSpPr>
@@ -9238,118 +9066,200 @@
           <a:lstStyle/>
           <a:p>
             <a:r>
-              <a:rPr lang="en-US" dirty="0">
+              <a:rPr lang="en-CA" dirty="0" smtClean="0"/>
+              <a:t>Data Pipe (%&gt;%)</a:t>
+            </a:r>
+            <a:endParaRPr lang="en-CA" dirty="0"/>
+          </a:p>
+        </p:txBody>
+      </p:sp>
+      <p:sp>
+        <p:nvSpPr>
+          <p:cNvPr id="3" name="Content Placeholder 2"/>
+          <p:cNvSpPr>
+            <a:spLocks noGrp="1"/>
+          </p:cNvSpPr>
+          <p:nvPr>
+            <p:ph idx="1"/>
+          </p:nvPr>
+        </p:nvSpPr>
+        <p:spPr/>
+        <p:txBody>
+          <a:bodyPr>
+            <a:normAutofit/>
+          </a:bodyPr>
+          <a:lstStyle/>
+          <a:p>
+            <a:pPr marL="0" indent="0">
+              <a:buNone/>
+            </a:pPr>
+            <a:r>
+              <a:rPr lang="en-CA" dirty="0" err="1">
+                <a:latin typeface="Consolas" panose="020B0609020204030204" pitchFamily="49" charset="0"/>
+              </a:rPr>
+              <a:t>iris_cleaned</a:t>
+            </a:r>
+            <a:r>
+              <a:rPr lang="en-CA" dirty="0">
+                <a:latin typeface="Consolas" panose="020B0609020204030204" pitchFamily="49" charset="0"/>
+              </a:rPr>
+              <a:t> &lt;- filter(iris, Species == "</a:t>
+            </a:r>
+            <a:r>
+              <a:rPr lang="en-CA" dirty="0" err="1">
+                <a:latin typeface="Consolas" panose="020B0609020204030204" pitchFamily="49" charset="0"/>
+              </a:rPr>
+              <a:t>setosa</a:t>
+            </a:r>
+            <a:r>
+              <a:rPr lang="en-CA" dirty="0">
+                <a:latin typeface="Consolas" panose="020B0609020204030204" pitchFamily="49" charset="0"/>
+              </a:rPr>
+              <a:t>")</a:t>
+            </a:r>
+          </a:p>
+          <a:p>
+            <a:pPr marL="0" indent="0">
+              <a:buNone/>
+            </a:pPr>
+            <a:r>
+              <a:rPr lang="en-CA" dirty="0" err="1">
+                <a:latin typeface="Consolas" panose="020B0609020204030204" pitchFamily="49" charset="0"/>
+              </a:rPr>
+              <a:t>iris_cleaned</a:t>
+            </a:r>
+            <a:r>
+              <a:rPr lang="en-CA" dirty="0">
+                <a:latin typeface="Consolas" panose="020B0609020204030204" pitchFamily="49" charset="0"/>
+              </a:rPr>
+              <a:t> &lt;- select(</a:t>
+            </a:r>
+            <a:r>
+              <a:rPr lang="en-CA" dirty="0" err="1">
+                <a:latin typeface="Consolas" panose="020B0609020204030204" pitchFamily="49" charset="0"/>
+              </a:rPr>
+              <a:t>iris_cleaned</a:t>
+            </a:r>
+            <a:r>
+              <a:rPr lang="en-CA" dirty="0">
+                <a:latin typeface="Consolas" panose="020B0609020204030204" pitchFamily="49" charset="0"/>
+              </a:rPr>
+              <a:t>, </a:t>
+            </a:r>
+            <a:r>
+              <a:rPr lang="en-CA" dirty="0" err="1">
+                <a:latin typeface="Consolas" panose="020B0609020204030204" pitchFamily="49" charset="0"/>
+              </a:rPr>
+              <a:t>Sepal.Length</a:t>
+            </a:r>
+            <a:r>
+              <a:rPr lang="en-CA" dirty="0">
+                <a:latin typeface="Consolas" panose="020B0609020204030204" pitchFamily="49" charset="0"/>
+              </a:rPr>
+              <a:t>)</a:t>
+            </a:r>
+          </a:p>
+          <a:p>
+            <a:pPr marL="0" indent="0">
+              <a:buNone/>
+            </a:pPr>
+            <a:endParaRPr lang="en-CA" dirty="0">
+              <a:latin typeface="Consolas" panose="020B0609020204030204" pitchFamily="49" charset="0"/>
+            </a:endParaRPr>
+          </a:p>
+          <a:p>
+            <a:pPr marL="0" indent="0">
+              <a:buNone/>
+            </a:pPr>
+            <a:r>
+              <a:rPr lang="en-CA" dirty="0" err="1" smtClean="0">
+                <a:latin typeface="Consolas" panose="020B0609020204030204" pitchFamily="49" charset="0"/>
+              </a:rPr>
+              <a:t>iris_cleaned</a:t>
+            </a:r>
+            <a:r>
+              <a:rPr lang="en-CA" dirty="0" smtClean="0">
+                <a:latin typeface="Consolas" panose="020B0609020204030204" pitchFamily="49" charset="0"/>
+              </a:rPr>
+              <a:t> </a:t>
+            </a:r>
+            <a:r>
+              <a:rPr lang="en-CA" dirty="0">
+                <a:latin typeface="Consolas" panose="020B0609020204030204" pitchFamily="49" charset="0"/>
+              </a:rPr>
+              <a:t>&lt;- iris </a:t>
+            </a:r>
+            <a:r>
+              <a:rPr lang="en-CA" b="1" dirty="0">
                 <a:solidFill>
-                  <a:srgbClr val="3989C9"/>
+                  <a:srgbClr val="FF0000"/>
                 </a:solidFill>
-              </a:rPr>
-              <a:t>R Graphics – Base plots (examples)</a:t>
-            </a:r>
-          </a:p>
-        </p:txBody>
-      </p:sp>
-      <p:pic>
-        <p:nvPicPr>
-          <p:cNvPr id="7" name="Picture 6"/>
-          <p:cNvPicPr>
-            <a:picLocks noChangeAspect="1"/>
-          </p:cNvPicPr>
-          <p:nvPr/>
-        </p:nvPicPr>
-        <p:blipFill>
-          <a:blip r:embed="rId2">
-            <a:extLst>
-              <a:ext uri="{28A0092B-C50C-407E-A947-70E740481C1C}">
-                <a14:useLocalDpi xmlns:a14="http://schemas.microsoft.com/office/drawing/2010/main" val="0"/>
-              </a:ext>
-            </a:extLst>
-          </a:blip>
-          <a:stretch>
-            <a:fillRect/>
-          </a:stretch>
-        </p:blipFill>
-        <p:spPr>
-          <a:xfrm>
-            <a:off x="1022465" y="1467045"/>
-            <a:ext cx="4090662" cy="4542338"/>
-          </a:xfrm>
-          <a:prstGeom prst="rect">
-            <a:avLst/>
-          </a:prstGeom>
-        </p:spPr>
-      </p:pic>
-      <p:pic>
-        <p:nvPicPr>
-          <p:cNvPr id="8" name="Picture 7"/>
-          <p:cNvPicPr>
-            <a:picLocks noChangeAspect="1"/>
-          </p:cNvPicPr>
-          <p:nvPr/>
-        </p:nvPicPr>
-        <p:blipFill>
-          <a:blip r:embed="rId3">
-            <a:extLst>
-              <a:ext uri="{28A0092B-C50C-407E-A947-70E740481C1C}">
-                <a14:useLocalDpi xmlns:a14="http://schemas.microsoft.com/office/drawing/2010/main" val="0"/>
-              </a:ext>
-            </a:extLst>
-          </a:blip>
-          <a:stretch>
-            <a:fillRect/>
-          </a:stretch>
-        </p:blipFill>
-        <p:spPr>
-          <a:xfrm>
-            <a:off x="5694218" y="1603637"/>
-            <a:ext cx="4405746" cy="4405746"/>
-          </a:xfrm>
-          <a:prstGeom prst="rect">
-            <a:avLst/>
-          </a:prstGeom>
-        </p:spPr>
-      </p:pic>
-      <p:sp>
-        <p:nvSpPr>
-          <p:cNvPr id="9" name="TextBox 8">
-            <a:extLst>
-              <a:ext uri="{FF2B5EF4-FFF2-40B4-BE49-F238E27FC236}">
-                <a16:creationId xmlns:a16="http://schemas.microsoft.com/office/drawing/2014/main" id="{2C5DBE70-7FDA-404D-9F97-9475B854D916}"/>
-              </a:ext>
-            </a:extLst>
-          </p:cNvPr>
-          <p:cNvSpPr txBox="1"/>
-          <p:nvPr/>
-        </p:nvSpPr>
-        <p:spPr>
-          <a:xfrm>
-            <a:off x="914399" y="6127234"/>
-            <a:ext cx="6122125" cy="369332"/>
-          </a:xfrm>
-          <a:prstGeom prst="rect">
-            <a:avLst/>
-          </a:prstGeom>
-          <a:noFill/>
-        </p:spPr>
-        <p:txBody>
-          <a:bodyPr wrap="square" rtlCol="0">
-            <a:spAutoFit/>
-          </a:bodyPr>
-          <a:lstStyle/>
-          <a:p>
-            <a:r>
-              <a:rPr lang="en-US" dirty="0">
-                <a:hlinkClick r:id="rId4"/>
-              </a:rPr>
-              <a:t>https://www.stat.auckland.ac.nz/~paul/RG3e/chapter2.html</a:t>
-            </a:r>
-            <a:endParaRPr lang="en-US" dirty="0"/>
+                <a:latin typeface="Consolas" panose="020B0609020204030204" pitchFamily="49" charset="0"/>
+              </a:rPr>
+              <a:t>%&gt;%</a:t>
+            </a:r>
+          </a:p>
+          <a:p>
+            <a:pPr marL="0" indent="0">
+              <a:buNone/>
+            </a:pPr>
+            <a:r>
+              <a:rPr lang="en-CA" dirty="0">
+                <a:latin typeface="Consolas" panose="020B0609020204030204" pitchFamily="49" charset="0"/>
+              </a:rPr>
+              <a:t>  filter(Species == "</a:t>
+            </a:r>
+            <a:r>
+              <a:rPr lang="en-CA" dirty="0" err="1">
+                <a:latin typeface="Consolas" panose="020B0609020204030204" pitchFamily="49" charset="0"/>
+              </a:rPr>
+              <a:t>setosa</a:t>
+            </a:r>
+            <a:r>
+              <a:rPr lang="en-CA" dirty="0">
+                <a:latin typeface="Consolas" panose="020B0609020204030204" pitchFamily="49" charset="0"/>
+              </a:rPr>
+              <a:t>") </a:t>
+            </a:r>
+            <a:r>
+              <a:rPr lang="en-CA" b="1" dirty="0">
+                <a:solidFill>
+                  <a:srgbClr val="FF0000"/>
+                </a:solidFill>
+                <a:latin typeface="Consolas" panose="020B0609020204030204" pitchFamily="49" charset="0"/>
+              </a:rPr>
+              <a:t>%&gt;%</a:t>
+            </a:r>
+          </a:p>
+          <a:p>
+            <a:pPr marL="0" indent="0">
+              <a:buNone/>
+            </a:pPr>
+            <a:r>
+              <a:rPr lang="en-CA" dirty="0">
+                <a:latin typeface="Consolas" panose="020B0609020204030204" pitchFamily="49" charset="0"/>
+              </a:rPr>
+              <a:t>  select(</a:t>
+            </a:r>
+            <a:r>
+              <a:rPr lang="en-CA" dirty="0" err="1">
+                <a:latin typeface="Consolas" panose="020B0609020204030204" pitchFamily="49" charset="0"/>
+              </a:rPr>
+              <a:t>Sepal.Length</a:t>
+            </a:r>
+            <a:r>
+              <a:rPr lang="en-CA" dirty="0">
+                <a:latin typeface="Consolas" panose="020B0609020204030204" pitchFamily="49" charset="0"/>
+              </a:rPr>
+              <a:t>)</a:t>
+            </a:r>
           </a:p>
         </p:txBody>
       </p:sp>
     </p:spTree>
     <p:extLst>
       <p:ext uri="{BB962C8B-B14F-4D97-AF65-F5344CB8AC3E}">
-        <p14:creationId xmlns:p14="http://schemas.microsoft.com/office/powerpoint/2010/main" val="1052538369"/>
+        <p14:creationId xmlns:p14="http://schemas.microsoft.com/office/powerpoint/2010/main" val="3252949927"/>
       </p:ext>
     </p:extLst>
   </p:cSld>
@@ -9378,13 +9288,7 @@
       </p:grpSpPr>
       <p:sp>
         <p:nvSpPr>
-          <p:cNvPr id="2" name="Title 1">
-            <a:extLst>
-              <a:ext uri="{FF2B5EF4-FFF2-40B4-BE49-F238E27FC236}">
-                <a16:creationId xmlns:a16="http://schemas.microsoft.com/office/drawing/2014/main" id="{7BA64387-4D68-4B6B-8A38-128610E12111}"/>
-              </a:ext>
-            </a:extLst>
-          </p:cNvPr>
+          <p:cNvPr id="2" name="Title 1"/>
           <p:cNvSpPr>
             <a:spLocks noGrp="1"/>
           </p:cNvSpPr>
@@ -9398,38 +9302,15 @@
           <a:lstStyle/>
           <a:p>
             <a:r>
-              <a:rPr lang="en-US" dirty="0">
-                <a:solidFill>
-                  <a:srgbClr val="3989C9"/>
-                </a:solidFill>
-              </a:rPr>
-              <a:t>R Graphics – Two Main </a:t>
-            </a:r>
-            <a:r>
-              <a:rPr lang="en-US">
-                <a:solidFill>
-                  <a:srgbClr val="3989C9"/>
-                </a:solidFill>
-              </a:rPr>
-              <a:t>Plotting Systems</a:t>
-            </a:r>
-            <a:endParaRPr lang="en-US" dirty="0">
-              <a:solidFill>
-                <a:srgbClr val="3989C9"/>
-              </a:solidFill>
-            </a:endParaRPr>
-          </a:p>
-        </p:txBody>
-      </p:sp>
-      <p:sp>
-        <p:nvSpPr>
-          <p:cNvPr id="3" name="Content Placeholder 2">
-            <a:extLst>
-              <a:ext uri="{FF2B5EF4-FFF2-40B4-BE49-F238E27FC236}">
-                <a16:creationId xmlns:a16="http://schemas.microsoft.com/office/drawing/2014/main" id="{38FC63AA-1117-4358-896D-E486DF010D1E}"/>
-              </a:ext>
-            </a:extLst>
-          </p:cNvPr>
+              <a:rPr lang="en-CA" dirty="0"/>
+              <a:t>Regression</a:t>
+            </a:r>
+          </a:p>
+        </p:txBody>
+      </p:sp>
+      <p:sp>
+        <p:nvSpPr>
+          <p:cNvPr id="3" name="Content Placeholder 2"/>
           <p:cNvSpPr>
             <a:spLocks noGrp="1"/>
           </p:cNvSpPr>
@@ -9439,95 +9320,161 @@
         </p:nvSpPr>
         <p:spPr/>
         <p:txBody>
-          <a:bodyPr/>
-          <a:lstStyle/>
-          <a:p>
-            <a:r>
-              <a:rPr lang="en-US" dirty="0"/>
-              <a:t>System?</a:t>
-            </a:r>
-          </a:p>
-          <a:p>
-            <a:endParaRPr lang="en-US" dirty="0"/>
-          </a:p>
-          <a:p>
-            <a:r>
-              <a:rPr lang="en-US" dirty="0"/>
-              <a:t>R package: lattice</a:t>
-            </a:r>
-          </a:p>
-          <a:p>
-            <a:pPr lvl="1"/>
-            <a:r>
-              <a:rPr lang="en-US" dirty="0"/>
-              <a:t>implements Trellis system by William Cleveland:</a:t>
-            </a:r>
-          </a:p>
-          <a:p>
-            <a:endParaRPr lang="en-US" dirty="0"/>
-          </a:p>
-          <a:p>
-            <a:r>
-              <a:rPr lang="en-US" dirty="0"/>
-              <a:t>R package: </a:t>
-            </a:r>
-            <a:r>
-              <a:rPr lang="en-US" dirty="0">
-                <a:hlinkClick r:id="rId3"/>
-              </a:rPr>
-              <a:t>ggplot2</a:t>
-            </a:r>
-            <a:endParaRPr lang="en-US" dirty="0"/>
-          </a:p>
-          <a:p>
-            <a:pPr lvl="1"/>
-            <a:r>
-              <a:rPr lang="en-US" dirty="0"/>
-              <a:t>implements "A Grammar of Graphics" by Leland Wilkinson</a:t>
-            </a:r>
-          </a:p>
-          <a:p>
-            <a:pPr lvl="1"/>
-            <a:r>
-              <a:rPr lang="en-US" b="1" dirty="0"/>
-              <a:t>Recommended</a:t>
-            </a:r>
-          </a:p>
-          <a:p>
-            <a:pPr marL="0" indent="0">
+          <a:bodyPr>
+            <a:normAutofit lnSpcReduction="10000"/>
+          </a:bodyPr>
+          <a:lstStyle/>
+          <a:p>
+            <a:r>
+              <a:rPr lang="en-CA" dirty="0"/>
+              <a:t>Multiple regressions: </a:t>
+            </a:r>
+            <a:r>
+              <a:rPr lang="en-CA" dirty="0">
+                <a:latin typeface="Consolas" panose="020B0609020204030204" pitchFamily="49" charset="0"/>
+                <a:hlinkClick r:id="rId2"/>
+              </a:rPr>
+              <a:t>lm()</a:t>
+            </a:r>
+            <a:r>
+              <a:rPr lang="en-CA" dirty="0"/>
+              <a:t> from </a:t>
+            </a:r>
+            <a:r>
+              <a:rPr lang="en-CA" dirty="0">
+                <a:latin typeface="Consolas" panose="020B0609020204030204" pitchFamily="49" charset="0"/>
+              </a:rPr>
+              <a:t>stats</a:t>
+            </a:r>
+            <a:r>
+              <a:rPr lang="en-CA" dirty="0"/>
+              <a:t> library in base R</a:t>
+            </a:r>
+          </a:p>
+          <a:p>
+            <a:pPr marL="0" indent="0" algn="ctr">
               <a:buNone/>
             </a:pPr>
-            <a:endParaRPr lang="en-US" dirty="0"/>
-          </a:p>
-          <a:p>
-            <a:pPr lvl="1"/>
-            <a:endParaRPr lang="en-US" dirty="0"/>
-          </a:p>
-          <a:p>
-            <a:pPr lvl="1"/>
-            <a:endParaRPr lang="en-US" dirty="0"/>
-          </a:p>
-          <a:p>
-            <a:endParaRPr lang="en-US" dirty="0"/>
-          </a:p>
-        </p:txBody>
-      </p:sp>
-      <p:sp>
-        <p:nvSpPr>
-          <p:cNvPr id="4" name="TextBox 3">
-            <a:extLst>
-              <a:ext uri="{FF2B5EF4-FFF2-40B4-BE49-F238E27FC236}">
-                <a16:creationId xmlns:a16="http://schemas.microsoft.com/office/drawing/2014/main" id="{2C5DBE70-7FDA-404D-9F97-9475B854D916}"/>
-              </a:ext>
-            </a:extLst>
-          </p:cNvPr>
+            <a:endParaRPr lang="en-CA" dirty="0">
+              <a:latin typeface="Consolas" panose="020B0609020204030204" pitchFamily="49" charset="0"/>
+            </a:endParaRPr>
+          </a:p>
+          <a:p>
+            <a:pPr marL="0" indent="0" algn="ctr">
+              <a:buNone/>
+            </a:pPr>
+            <a:r>
+              <a:rPr lang="en-CA" dirty="0" err="1">
+                <a:latin typeface="Consolas" panose="020B0609020204030204" pitchFamily="49" charset="0"/>
+              </a:rPr>
+              <a:t>my_model</a:t>
+            </a:r>
+            <a:r>
+              <a:rPr lang="en-CA" dirty="0">
+                <a:latin typeface="Consolas" panose="020B0609020204030204" pitchFamily="49" charset="0"/>
+              </a:rPr>
+              <a:t> &lt;- lm(y ~ x1 + x2, data)</a:t>
+            </a:r>
+          </a:p>
+          <a:p>
+            <a:endParaRPr lang="en-CA" dirty="0"/>
+          </a:p>
+          <a:p>
+            <a:r>
+              <a:rPr lang="en-CA" dirty="0"/>
+              <a:t>IV regressions: </a:t>
+            </a:r>
+            <a:r>
+              <a:rPr lang="en-CA" dirty="0" err="1">
+                <a:latin typeface="Consolas" panose="020B0609020204030204" pitchFamily="49" charset="0"/>
+                <a:hlinkClick r:id="rId3"/>
+              </a:rPr>
+              <a:t>ivreg</a:t>
+            </a:r>
+            <a:r>
+              <a:rPr lang="en-CA" dirty="0">
+                <a:latin typeface="Consolas" panose="020B0609020204030204" pitchFamily="49" charset="0"/>
+                <a:hlinkClick r:id="rId3"/>
+              </a:rPr>
+              <a:t>()</a:t>
+            </a:r>
+            <a:r>
+              <a:rPr lang="en-CA" dirty="0"/>
+              <a:t> from </a:t>
+            </a:r>
+            <a:r>
+              <a:rPr lang="en-CA" dirty="0">
+                <a:latin typeface="Consolas" panose="020B0609020204030204" pitchFamily="49" charset="0"/>
+                <a:hlinkClick r:id="rId4"/>
+              </a:rPr>
+              <a:t>AER</a:t>
+            </a:r>
+            <a:r>
+              <a:rPr lang="en-CA" dirty="0"/>
+              <a:t> library</a:t>
+            </a:r>
+          </a:p>
+          <a:p>
+            <a:endParaRPr lang="en-CA" dirty="0"/>
+          </a:p>
+          <a:p>
+            <a:pPr marL="0" indent="0" algn="ctr">
+              <a:buNone/>
+            </a:pPr>
+            <a:r>
+              <a:rPr lang="en-CA" dirty="0" err="1">
+                <a:latin typeface="Consolas" panose="020B0609020204030204" pitchFamily="49" charset="0"/>
+              </a:rPr>
+              <a:t>my_iv_model</a:t>
+            </a:r>
+            <a:r>
+              <a:rPr lang="en-CA" dirty="0">
+                <a:latin typeface="Consolas" panose="020B0609020204030204" pitchFamily="49" charset="0"/>
+              </a:rPr>
+              <a:t> &lt;- </a:t>
+            </a:r>
+            <a:r>
+              <a:rPr lang="en-CA" dirty="0" err="1">
+                <a:latin typeface="Consolas" panose="020B0609020204030204" pitchFamily="49" charset="0"/>
+              </a:rPr>
+              <a:t>ivreg</a:t>
+            </a:r>
+            <a:r>
+              <a:rPr lang="en-CA" dirty="0">
+                <a:latin typeface="Consolas" panose="020B0609020204030204" pitchFamily="49" charset="0"/>
+              </a:rPr>
+              <a:t>(y ~ x + w | w + z, data)</a:t>
+            </a:r>
+          </a:p>
+          <a:p>
+            <a:endParaRPr lang="en-CA" dirty="0">
+              <a:latin typeface="Consolas" panose="020B0609020204030204" pitchFamily="49" charset="0"/>
+            </a:endParaRPr>
+          </a:p>
+          <a:p>
+            <a:r>
+              <a:rPr lang="en-CA" dirty="0"/>
+              <a:t>Regression result summary: </a:t>
+            </a:r>
+            <a:r>
+              <a:rPr lang="en-CA" dirty="0">
+                <a:latin typeface="Consolas" panose="020B0609020204030204" pitchFamily="49" charset="0"/>
+              </a:rPr>
+              <a:t>summary()</a:t>
+            </a:r>
+          </a:p>
+        </p:txBody>
+      </p:sp>
+      <p:sp>
+        <p:nvSpPr>
+          <p:cNvPr id="4" name="TextBox 3"/>
           <p:cNvSpPr txBox="1"/>
           <p:nvPr/>
         </p:nvSpPr>
         <p:spPr>
           <a:xfrm>
-            <a:off x="914399" y="5850235"/>
-            <a:ext cx="6122125" cy="646331"/>
+            <a:off x="6152140" y="4989095"/>
+            <a:ext cx="1096454" cy="307777"/>
           </a:xfrm>
           <a:prstGeom prst="rect">
             <a:avLst/>
@@ -9535,94 +9482,130 @@
           <a:noFill/>
         </p:spPr>
         <p:txBody>
-          <a:bodyPr wrap="square" rtlCol="0">
+          <a:bodyPr wrap="none" rtlCol="0">
             <a:spAutoFit/>
           </a:bodyPr>
           <a:lstStyle/>
           <a:p>
             <a:r>
-              <a:rPr lang="en-US" dirty="0">
-                <a:hlinkClick r:id="rId4"/>
-              </a:rPr>
-              <a:t>https://www.stat.auckland.ac.nz/~paul/RG3e/chapter4.html</a:t>
-            </a:r>
-            <a:endParaRPr lang="en-US" dirty="0"/>
-          </a:p>
-          <a:p>
-            <a:r>
-              <a:rPr lang="en-US" dirty="0">
-                <a:hlinkClick r:id="rId5"/>
-              </a:rPr>
-              <a:t>https://www.stat.auckland.ac.nz/~paul/RG3e/chapter5.html</a:t>
-            </a:r>
-            <a:endParaRPr lang="en-US" dirty="0"/>
-          </a:p>
-        </p:txBody>
-      </p:sp>
-      <p:pic>
-        <p:nvPicPr>
-          <p:cNvPr id="5" name="Picture 4"/>
-          <p:cNvPicPr>
-            <a:picLocks noChangeAspect="1"/>
-          </p:cNvPicPr>
+              <a:rPr lang="en-CA" sz="1400" b="1" dirty="0">
+                <a:solidFill>
+                  <a:srgbClr val="FF0000"/>
+                </a:solidFill>
+              </a:rPr>
+              <a:t>endogenous</a:t>
+            </a:r>
+          </a:p>
+        </p:txBody>
+      </p:sp>
+      <p:sp>
+        <p:nvSpPr>
+          <p:cNvPr id="5" name="TextBox 4"/>
+          <p:cNvSpPr txBox="1"/>
           <p:nvPr/>
-        </p:nvPicPr>
-        <p:blipFill>
-          <a:blip r:embed="rId6">
-            <a:extLst>
-              <a:ext uri="{28A0092B-C50C-407E-A947-70E740481C1C}">
-                <a14:useLocalDpi xmlns:a14="http://schemas.microsoft.com/office/drawing/2010/main" val="0"/>
-              </a:ext>
-            </a:extLst>
-          </a:blip>
-          <a:stretch>
-            <a:fillRect/>
-          </a:stretch>
-        </p:blipFill>
+        </p:nvSpPr>
         <p:spPr>
           <a:xfrm>
-            <a:off x="7658355" y="1506022"/>
-            <a:ext cx="2344626" cy="2344626"/>
+            <a:off x="6978308" y="4301508"/>
+            <a:ext cx="978922" cy="307777"/>
           </a:xfrm>
           <a:prstGeom prst="rect">
             <a:avLst/>
           </a:prstGeom>
+          <a:noFill/>
         </p:spPr>
-      </p:pic>
-      <p:pic>
-        <p:nvPicPr>
-          <p:cNvPr id="6" name="Picture 5"/>
-          <p:cNvPicPr>
-            <a:picLocks noChangeAspect="1"/>
-          </p:cNvPicPr>
+        <p:txBody>
+          <a:bodyPr wrap="none" rtlCol="0">
+            <a:spAutoFit/>
+          </a:bodyPr>
+          <a:lstStyle/>
+          <a:p>
+            <a:r>
+              <a:rPr lang="en-CA" sz="1400" b="1" dirty="0"/>
+              <a:t>exogenous</a:t>
+            </a:r>
+          </a:p>
+        </p:txBody>
+      </p:sp>
+      <p:sp>
+        <p:nvSpPr>
+          <p:cNvPr id="10" name="TextBox 9"/>
+          <p:cNvSpPr txBox="1"/>
           <p:nvPr/>
-        </p:nvPicPr>
-        <p:blipFill>
-          <a:blip r:embed="rId7">
-            <a:extLst>
-              <a:ext uri="{28A0092B-C50C-407E-A947-70E740481C1C}">
-                <a14:useLocalDpi xmlns:a14="http://schemas.microsoft.com/office/drawing/2010/main" val="0"/>
-              </a:ext>
-            </a:extLst>
-          </a:blip>
-          <a:stretch>
-            <a:fillRect/>
-          </a:stretch>
-        </p:blipFill>
+        </p:nvSpPr>
         <p:spPr>
           <a:xfrm>
-            <a:off x="8995064" y="3850648"/>
-            <a:ext cx="2651068" cy="2651068"/>
+            <a:off x="8554705" y="4983298"/>
+            <a:ext cx="1011367" cy="307777"/>
           </a:xfrm>
           <a:prstGeom prst="rect">
             <a:avLst/>
           </a:prstGeom>
+          <a:noFill/>
         </p:spPr>
-      </p:pic>
+        <p:txBody>
+          <a:bodyPr wrap="none" rtlCol="0">
+            <a:spAutoFit/>
+          </a:bodyPr>
+          <a:lstStyle/>
+          <a:p>
+            <a:r>
+              <a:rPr lang="en-CA" sz="1400" b="1" dirty="0">
+                <a:solidFill>
+                  <a:srgbClr val="FF0000"/>
+                </a:solidFill>
+              </a:rPr>
+              <a:t>instrument</a:t>
+            </a:r>
+          </a:p>
+        </p:txBody>
+      </p:sp>
+      <p:sp>
+        <p:nvSpPr>
+          <p:cNvPr id="11" name="TextBox 10">
+            <a:extLst>
+              <a:ext uri="{FF2B5EF4-FFF2-40B4-BE49-F238E27FC236}">
+                <a16:creationId xmlns:a16="http://schemas.microsoft.com/office/drawing/2014/main" id="{116C3521-D943-44B3-A3CD-E9BD9D31B3A6}"/>
+              </a:ext>
+            </a:extLst>
+          </p:cNvPr>
+          <p:cNvSpPr txBox="1"/>
+          <p:nvPr/>
+        </p:nvSpPr>
+        <p:spPr>
+          <a:xfrm>
+            <a:off x="865391" y="6123543"/>
+            <a:ext cx="6308918" cy="369332"/>
+          </a:xfrm>
+          <a:prstGeom prst="rect">
+            <a:avLst/>
+          </a:prstGeom>
+          <a:noFill/>
+        </p:spPr>
+        <p:txBody>
+          <a:bodyPr wrap="square" rtlCol="0">
+            <a:spAutoFit/>
+          </a:bodyPr>
+          <a:lstStyle/>
+          <a:p>
+            <a:r>
+              <a:rPr lang="en-US" dirty="0"/>
+              <a:t>Ref. </a:t>
+            </a:r>
+            <a:r>
+              <a:rPr lang="en-US" dirty="0">
+                <a:hlinkClick r:id="rId5"/>
+              </a:rPr>
+              <a:t>https://rpubs.com/wsundstrom/t_ivreg</a:t>
+            </a:r>
+            <a:endParaRPr lang="en-US" dirty="0"/>
+          </a:p>
+        </p:txBody>
+      </p:sp>
     </p:spTree>
     <p:extLst>
       <p:ext uri="{BB962C8B-B14F-4D97-AF65-F5344CB8AC3E}">
-        <p14:creationId xmlns:p14="http://schemas.microsoft.com/office/powerpoint/2010/main" val="619026221"/>
+        <p14:creationId xmlns:p14="http://schemas.microsoft.com/office/powerpoint/2010/main" val="2855024186"/>
       </p:ext>
     </p:extLst>
   </p:cSld>
@@ -9820,42 +9803,176 @@
           <a:chExt cx="0" cy="0"/>
         </a:xfrm>
       </p:grpSpPr>
-      <p:pic>
-        <p:nvPicPr>
-          <p:cNvPr id="5" name="Picture 4">
+      <p:sp>
+        <p:nvSpPr>
+          <p:cNvPr id="2" name="Title 1"/>
+          <p:cNvSpPr>
+            <a:spLocks noGrp="1"/>
+          </p:cNvSpPr>
+          <p:nvPr>
+            <p:ph type="title"/>
+          </p:nvPr>
+        </p:nvSpPr>
+        <p:spPr/>
+        <p:txBody>
+          <a:bodyPr/>
+          <a:lstStyle/>
+          <a:p>
+            <a:r>
+              <a:rPr lang="en-CA" dirty="0"/>
+              <a:t>Report</a:t>
+            </a:r>
+          </a:p>
+        </p:txBody>
+      </p:sp>
+      <p:sp>
+        <p:nvSpPr>
+          <p:cNvPr id="3" name="Content Placeholder 2"/>
+          <p:cNvSpPr>
+            <a:spLocks noGrp="1"/>
+          </p:cNvSpPr>
+          <p:nvPr>
+            <p:ph idx="1"/>
+          </p:nvPr>
+        </p:nvSpPr>
+        <p:spPr/>
+        <p:txBody>
+          <a:bodyPr/>
+          <a:lstStyle/>
+          <a:p>
+            <a:r>
+              <a:rPr lang="en-CA" dirty="0"/>
+              <a:t>Summary table</a:t>
+            </a:r>
+          </a:p>
+          <a:p>
+            <a:pPr lvl="1"/>
+            <a:r>
+              <a:rPr lang="en-CA" dirty="0">
+                <a:hlinkClick r:id="rId2"/>
+              </a:rPr>
+              <a:t>Summary for lm()</a:t>
+            </a:r>
+            <a:r>
+              <a:rPr lang="en-CA" dirty="0"/>
+              <a:t>:</a:t>
+            </a:r>
+            <a:r>
+              <a:rPr lang="en-CA" dirty="0">
+                <a:latin typeface="Consolas" panose="020B0609020204030204" pitchFamily="49" charset="0"/>
+              </a:rPr>
+              <a:t> summary(</a:t>
+            </a:r>
+            <a:r>
+              <a:rPr lang="en-CA" dirty="0" err="1">
+                <a:latin typeface="Consolas" panose="020B0609020204030204" pitchFamily="49" charset="0"/>
+              </a:rPr>
+              <a:t>my_model</a:t>
+            </a:r>
+            <a:r>
+              <a:rPr lang="en-CA" dirty="0">
+                <a:latin typeface="Consolas" panose="020B0609020204030204" pitchFamily="49" charset="0"/>
+              </a:rPr>
+              <a:t>)</a:t>
+            </a:r>
+          </a:p>
+          <a:p>
+            <a:pPr lvl="1"/>
+            <a:r>
+              <a:rPr lang="en-CA" dirty="0">
+                <a:hlinkClick r:id="rId3"/>
+              </a:rPr>
+              <a:t>Summary for </a:t>
+            </a:r>
+            <a:r>
+              <a:rPr lang="en-CA" dirty="0" err="1">
+                <a:hlinkClick r:id="rId3"/>
+              </a:rPr>
+              <a:t>ivreg</a:t>
+            </a:r>
+            <a:r>
+              <a:rPr lang="en-CA" dirty="0">
+                <a:hlinkClick r:id="rId3"/>
+              </a:rPr>
+              <a:t>()</a:t>
+            </a:r>
+            <a:r>
+              <a:rPr lang="en-CA" dirty="0"/>
+              <a:t>:</a:t>
+            </a:r>
+            <a:r>
+              <a:rPr lang="en-CA" dirty="0">
+                <a:latin typeface="Consolas" panose="020B0609020204030204" pitchFamily="49" charset="0"/>
+              </a:rPr>
+              <a:t> summary(</a:t>
+            </a:r>
+            <a:r>
+              <a:rPr lang="en-CA" dirty="0" err="1">
+                <a:latin typeface="Consolas" panose="020B0609020204030204" pitchFamily="49" charset="0"/>
+              </a:rPr>
+              <a:t>my_iv_model</a:t>
+            </a:r>
+            <a:r>
+              <a:rPr lang="en-CA" dirty="0">
+                <a:latin typeface="Consolas" panose="020B0609020204030204" pitchFamily="49" charset="0"/>
+              </a:rPr>
+              <a:t>)</a:t>
+            </a:r>
+            <a:endParaRPr lang="en-CA" dirty="0"/>
+          </a:p>
+          <a:p>
+            <a:endParaRPr lang="en-CA" dirty="0"/>
+          </a:p>
+          <a:p>
+            <a:r>
+              <a:rPr lang="en-CA" dirty="0"/>
+              <a:t>publication-ready table: </a:t>
+            </a:r>
+            <a:r>
+              <a:rPr lang="en-CA" dirty="0">
+                <a:latin typeface="Consolas" panose="020B0609020204030204" pitchFamily="49" charset="0"/>
+                <a:hlinkClick r:id="rId4"/>
+              </a:rPr>
+              <a:t>stargazer()</a:t>
+            </a:r>
+            <a:r>
+              <a:rPr lang="en-CA" dirty="0"/>
+              <a:t> from </a:t>
+            </a:r>
+            <a:r>
+              <a:rPr lang="en-CA" dirty="0">
+                <a:latin typeface="Consolas" panose="020B0609020204030204" pitchFamily="49" charset="0"/>
+                <a:hlinkClick r:id="rId5"/>
+              </a:rPr>
+              <a:t>stargazer</a:t>
+            </a:r>
+            <a:r>
+              <a:rPr lang="en-CA" dirty="0"/>
+              <a:t> library</a:t>
+            </a:r>
+          </a:p>
+          <a:p>
+            <a:endParaRPr lang="en-CA" dirty="0"/>
+          </a:p>
+          <a:p>
+            <a:pPr marL="0" indent="0" algn="ctr">
+              <a:buNone/>
+            </a:pPr>
+            <a:r>
+              <a:rPr lang="en-CA" dirty="0">
+                <a:latin typeface="Consolas" panose="020B0609020204030204" pitchFamily="49" charset="0"/>
+              </a:rPr>
+              <a:t>stargazer(my_model1, my_model2, …)</a:t>
+            </a:r>
+          </a:p>
+        </p:txBody>
+      </p:sp>
+      <p:sp>
+        <p:nvSpPr>
+          <p:cNvPr id="4" name="TextBox 3">
             <a:extLst>
               <a:ext uri="{FF2B5EF4-FFF2-40B4-BE49-F238E27FC236}">
-                <a16:creationId xmlns:a16="http://schemas.microsoft.com/office/drawing/2014/main" id="{46C5D4C3-730C-4869-927A-0E5F42CEF67E}"/>
-              </a:ext>
-            </a:extLst>
-          </p:cNvPr>
-          <p:cNvPicPr>
-            <a:picLocks noChangeAspect="1"/>
-          </p:cNvPicPr>
-          <p:nvPr/>
-        </p:nvPicPr>
-        <p:blipFill>
-          <a:blip r:embed="rId2"/>
-          <a:stretch>
-            <a:fillRect/>
-          </a:stretch>
-        </p:blipFill>
-        <p:spPr>
-          <a:xfrm>
-            <a:off x="1025539" y="3771343"/>
-            <a:ext cx="3413559" cy="1973286"/>
-          </a:xfrm>
-          <a:prstGeom prst="rect">
-            <a:avLst/>
-          </a:prstGeom>
-        </p:spPr>
-      </p:pic>
-      <p:sp>
-        <p:nvSpPr>
-          <p:cNvPr id="8" name="TextBox 7">
-            <a:extLst>
-              <a:ext uri="{FF2B5EF4-FFF2-40B4-BE49-F238E27FC236}">
-                <a16:creationId xmlns:a16="http://schemas.microsoft.com/office/drawing/2014/main" id="{2C5DBE70-7FDA-404D-9F97-9475B854D916}"/>
+                <a16:creationId xmlns:a16="http://schemas.microsoft.com/office/drawing/2014/main" id="{116C3521-D943-44B3-A3CD-E9BD9D31B3A6}"/>
               </a:ext>
             </a:extLst>
           </p:cNvPr>
@@ -9864,8 +9981,8 @@
         </p:nvSpPr>
         <p:spPr>
           <a:xfrm>
-            <a:off x="1353586" y="5711378"/>
-            <a:ext cx="3108961" cy="923330"/>
+            <a:off x="865391" y="6123543"/>
+            <a:ext cx="8591430" cy="369332"/>
           </a:xfrm>
           <a:prstGeom prst="rect">
             <a:avLst/>
@@ -9880,385 +9997,13 @@
           <a:p>
             <a:r>
               <a:rPr lang="en-US" dirty="0"/>
-              <a:t>3D tri-surface interactive plot using the </a:t>
-            </a:r>
-            <a:r>
-              <a:rPr lang="en-US" dirty="0" err="1"/>
-              <a:t>plotly</a:t>
-            </a:r>
-            <a:r>
-              <a:rPr lang="en-US" dirty="0"/>
-              <a:t> package</a:t>
-            </a:r>
-          </a:p>
-          <a:p>
+              <a:t>Ref. </a:t>
+            </a:r>
             <a:r>
               <a:rPr lang="en-US" dirty="0">
-                <a:hlinkClick r:id="rId3"/>
-              </a:rPr>
-              <a:t>https://plot.ly/r/trisurf/</a:t>
-            </a:r>
-            <a:endParaRPr lang="en-US" dirty="0"/>
-          </a:p>
-        </p:txBody>
-      </p:sp>
-      <p:sp>
-        <p:nvSpPr>
-          <p:cNvPr id="2" name="Title 1">
-            <a:extLst>
-              <a:ext uri="{FF2B5EF4-FFF2-40B4-BE49-F238E27FC236}">
-                <a16:creationId xmlns:a16="http://schemas.microsoft.com/office/drawing/2014/main" id="{12332406-F5D3-48A4-A938-2AEE57703D73}"/>
-              </a:ext>
-            </a:extLst>
-          </p:cNvPr>
-          <p:cNvSpPr>
-            <a:spLocks noGrp="1"/>
-          </p:cNvSpPr>
-          <p:nvPr>
-            <p:ph type="title"/>
-          </p:nvPr>
-        </p:nvSpPr>
-        <p:spPr/>
-        <p:txBody>
-          <a:bodyPr/>
-          <a:lstStyle/>
-          <a:p>
-            <a:r>
-              <a:rPr lang="en-US" dirty="0"/>
-              <a:t>Other Specialized Plots</a:t>
-            </a:r>
-          </a:p>
-        </p:txBody>
-      </p:sp>
-      <p:sp>
-        <p:nvSpPr>
-          <p:cNvPr id="3" name="Content Placeholder 2">
-            <a:extLst>
-              <a:ext uri="{FF2B5EF4-FFF2-40B4-BE49-F238E27FC236}">
-                <a16:creationId xmlns:a16="http://schemas.microsoft.com/office/drawing/2014/main" id="{3CC0CD8E-594A-47CD-AD0A-9D561B6C3613}"/>
-              </a:ext>
-            </a:extLst>
-          </p:cNvPr>
-          <p:cNvSpPr>
-            <a:spLocks noGrp="1"/>
-          </p:cNvSpPr>
-          <p:nvPr>
-            <p:ph idx="1"/>
-          </p:nvPr>
-        </p:nvSpPr>
-        <p:spPr/>
-        <p:txBody>
-          <a:bodyPr/>
-          <a:lstStyle/>
-          <a:p>
-            <a:r>
-              <a:rPr lang="en-US" dirty="0"/>
-              <a:t>Graphic functions provided by specialized packages</a:t>
-            </a:r>
-          </a:p>
-          <a:p>
-            <a:pPr lvl="1"/>
-            <a:r>
-              <a:rPr lang="en-US" dirty="0"/>
-              <a:t>Based on R primitive graphical engines like </a:t>
-            </a:r>
-            <a:r>
-              <a:rPr lang="en-US" dirty="0">
-                <a:hlinkClick r:id="rId4"/>
-              </a:rPr>
-              <a:t>grid</a:t>
-            </a:r>
-            <a:r>
-              <a:rPr lang="en-US" dirty="0"/>
-              <a:t> (</a:t>
-            </a:r>
-            <a:r>
-              <a:rPr lang="en-US" dirty="0" err="1"/>
-              <a:t>eg</a:t>
-            </a:r>
-            <a:r>
-              <a:rPr lang="en-US" dirty="0"/>
-              <a:t>. plot() in </a:t>
-            </a:r>
-            <a:r>
-              <a:rPr lang="en-US" dirty="0">
-                <a:hlinkClick r:id="rId5"/>
-              </a:rPr>
-              <a:t>party</a:t>
-            </a:r>
-            <a:r>
-              <a:rPr lang="en-US" dirty="0"/>
-              <a:t>, </a:t>
-            </a:r>
-            <a:r>
-              <a:rPr lang="en-US" dirty="0" err="1">
                 <a:hlinkClick r:id="rId6"/>
               </a:rPr>
-              <a:t>igraph</a:t>
-            </a:r>
-            <a:r>
-              <a:rPr lang="en-US" dirty="0"/>
-              <a:t>)</a:t>
-            </a:r>
-          </a:p>
-          <a:p>
-            <a:pPr lvl="1"/>
-            <a:r>
-              <a:rPr lang="en-US" dirty="0"/>
-              <a:t>Following a plotting system (</a:t>
-            </a:r>
-            <a:r>
-              <a:rPr lang="en-US" dirty="0" err="1"/>
-              <a:t>eg</a:t>
-            </a:r>
-            <a:r>
-              <a:rPr lang="en-US" dirty="0"/>
-              <a:t>. </a:t>
-            </a:r>
-            <a:r>
-              <a:rPr lang="en-US" dirty="0" err="1">
-                <a:hlinkClick r:id="rId7"/>
-              </a:rPr>
-              <a:t>ggmap</a:t>
-            </a:r>
-            <a:r>
-              <a:rPr lang="en-US" dirty="0"/>
-              <a:t>, </a:t>
-            </a:r>
-            <a:r>
-              <a:rPr lang="en-US" dirty="0" err="1">
-                <a:hlinkClick r:id="rId8"/>
-              </a:rPr>
-              <a:t>tmap</a:t>
-            </a:r>
-            <a:r>
-              <a:rPr lang="en-US" dirty="0"/>
-              <a:t>, </a:t>
-            </a:r>
-            <a:r>
-              <a:rPr lang="en-US" dirty="0" err="1">
-                <a:hlinkClick r:id="rId9"/>
-              </a:rPr>
-              <a:t>gganimate</a:t>
-            </a:r>
-            <a:r>
-              <a:rPr lang="en-US" dirty="0"/>
-              <a:t>, </a:t>
-            </a:r>
-            <a:r>
-              <a:rPr lang="en-US" dirty="0" err="1">
-                <a:hlinkClick r:id="rId10"/>
-              </a:rPr>
-              <a:t>plotly</a:t>
-            </a:r>
-            <a:r>
-              <a:rPr lang="en-US" dirty="0"/>
-              <a:t>, etc.)</a:t>
-            </a:r>
-          </a:p>
-          <a:p>
-            <a:pPr lvl="1"/>
-            <a:r>
-              <a:rPr lang="en-US" dirty="0"/>
-              <a:t>Wrapper of plotting tools in another languages (ex. </a:t>
-            </a:r>
-            <a:r>
-              <a:rPr lang="en-US" dirty="0">
-                <a:hlinkClick r:id="rId11"/>
-              </a:rPr>
-              <a:t>leaflet</a:t>
-            </a:r>
-            <a:r>
-              <a:rPr lang="en-US" dirty="0"/>
-              <a:t>, </a:t>
-            </a:r>
-            <a:r>
-              <a:rPr lang="en-US" dirty="0" err="1">
-                <a:hlinkClick r:id="rId12"/>
-              </a:rPr>
-              <a:t>grViz</a:t>
-            </a:r>
-            <a:r>
-              <a:rPr lang="en-US" dirty="0">
-                <a:hlinkClick r:id="rId12"/>
-              </a:rPr>
-              <a:t>()</a:t>
-            </a:r>
-            <a:r>
-              <a:rPr lang="en-US" dirty="0"/>
-              <a:t> in  </a:t>
-            </a:r>
-            <a:r>
-              <a:rPr lang="en-US" dirty="0" err="1">
-                <a:hlinkClick r:id="rId13"/>
-              </a:rPr>
-              <a:t>DiagrammeR</a:t>
-            </a:r>
-            <a:r>
-              <a:rPr lang="en-US" dirty="0"/>
-              <a:t>)</a:t>
-            </a:r>
-          </a:p>
-          <a:p>
-            <a:pPr lvl="1"/>
-            <a:endParaRPr lang="en-US" dirty="0"/>
-          </a:p>
-          <a:p>
-            <a:endParaRPr lang="en-US" dirty="0"/>
-          </a:p>
-        </p:txBody>
-      </p:sp>
-      <p:sp>
-        <p:nvSpPr>
-          <p:cNvPr id="6" name="TextBox 5">
-            <a:extLst>
-              <a:ext uri="{FF2B5EF4-FFF2-40B4-BE49-F238E27FC236}">
-                <a16:creationId xmlns:a16="http://schemas.microsoft.com/office/drawing/2014/main" id="{2C5DBE70-7FDA-404D-9F97-9475B854D916}"/>
-              </a:ext>
-            </a:extLst>
-          </p:cNvPr>
-          <p:cNvSpPr txBox="1"/>
-          <p:nvPr/>
-        </p:nvSpPr>
-        <p:spPr>
-          <a:xfrm>
-            <a:off x="4439098" y="5728003"/>
-            <a:ext cx="3890357" cy="923330"/>
-          </a:xfrm>
-          <a:prstGeom prst="rect">
-            <a:avLst/>
-          </a:prstGeom>
-          <a:noFill/>
-        </p:spPr>
-        <p:txBody>
-          <a:bodyPr wrap="square" rtlCol="0">
-            <a:spAutoFit/>
-          </a:bodyPr>
-          <a:lstStyle/>
-          <a:p>
-            <a:r>
-              <a:rPr lang="en-US" dirty="0"/>
-              <a:t>Decision tree plot using party package</a:t>
-            </a:r>
-          </a:p>
-          <a:p>
-            <a:r>
-              <a:rPr lang="en-US" dirty="0">
-                <a:hlinkClick r:id="rId14"/>
-              </a:rPr>
-              <a:t>https://www.statmethods.net/advstats/cart.html</a:t>
-            </a:r>
-            <a:endParaRPr lang="en-US" dirty="0"/>
-          </a:p>
-        </p:txBody>
-      </p:sp>
-      <p:pic>
-        <p:nvPicPr>
-          <p:cNvPr id="10" name="Picture 9"/>
-          <p:cNvPicPr>
-            <a:picLocks noChangeAspect="1"/>
-          </p:cNvPicPr>
-          <p:nvPr/>
-        </p:nvPicPr>
-        <p:blipFill>
-          <a:blip r:embed="rId15">
-            <a:extLst>
-              <a:ext uri="{28A0092B-C50C-407E-A947-70E740481C1C}">
-                <a14:useLocalDpi xmlns:a14="http://schemas.microsoft.com/office/drawing/2010/main" val="0"/>
-              </a:ext>
-            </a:extLst>
-          </a:blip>
-          <a:stretch>
-            <a:fillRect/>
-          </a:stretch>
-        </p:blipFill>
-        <p:spPr>
-          <a:xfrm>
-            <a:off x="5197381" y="3654757"/>
-            <a:ext cx="2089872" cy="2089872"/>
-          </a:xfrm>
-          <a:prstGeom prst="rect">
-            <a:avLst/>
-          </a:prstGeom>
-        </p:spPr>
-      </p:pic>
-      <p:pic>
-        <p:nvPicPr>
-          <p:cNvPr id="15" name="Picture 14"/>
-          <p:cNvPicPr>
-            <a:picLocks noChangeAspect="1"/>
-          </p:cNvPicPr>
-          <p:nvPr/>
-        </p:nvPicPr>
-        <p:blipFill>
-          <a:blip r:embed="rId16">
-            <a:extLst>
-              <a:ext uri="{28A0092B-C50C-407E-A947-70E740481C1C}">
-                <a14:useLocalDpi xmlns:a14="http://schemas.microsoft.com/office/drawing/2010/main" val="0"/>
-              </a:ext>
-            </a:extLst>
-          </a:blip>
-          <a:stretch>
-            <a:fillRect/>
-          </a:stretch>
-        </p:blipFill>
-        <p:spPr>
-          <a:xfrm>
-            <a:off x="8222653" y="3712946"/>
-            <a:ext cx="2743220" cy="2009790"/>
-          </a:xfrm>
-          <a:prstGeom prst="rect">
-            <a:avLst/>
-          </a:prstGeom>
-        </p:spPr>
-      </p:pic>
-      <p:sp>
-        <p:nvSpPr>
-          <p:cNvPr id="16" name="TextBox 15">
-            <a:extLst>
-              <a:ext uri="{FF2B5EF4-FFF2-40B4-BE49-F238E27FC236}">
-                <a16:creationId xmlns:a16="http://schemas.microsoft.com/office/drawing/2014/main" id="{2C5DBE70-7FDA-404D-9F97-9475B854D916}"/>
-              </a:ext>
-            </a:extLst>
-          </p:cNvPr>
-          <p:cNvSpPr txBox="1"/>
-          <p:nvPr/>
-        </p:nvSpPr>
-        <p:spPr>
-          <a:xfrm>
-            <a:off x="8222653" y="5728540"/>
-            <a:ext cx="3556921" cy="646331"/>
-          </a:xfrm>
-          <a:prstGeom prst="rect">
-            <a:avLst/>
-          </a:prstGeom>
-          <a:noFill/>
-        </p:spPr>
-        <p:txBody>
-          <a:bodyPr wrap="square" rtlCol="0">
-            <a:spAutoFit/>
-          </a:bodyPr>
-          <a:lstStyle/>
-          <a:p>
-            <a:r>
-              <a:rPr lang="en-US" dirty="0"/>
-              <a:t>Network plot using </a:t>
-            </a:r>
-            <a:r>
-              <a:rPr lang="en-US" dirty="0" err="1"/>
-              <a:t>igraph</a:t>
-            </a:r>
-            <a:r>
-              <a:rPr lang="en-US" dirty="0"/>
-              <a:t> package</a:t>
-            </a:r>
-          </a:p>
-          <a:p>
-            <a:r>
-              <a:rPr lang="en-US" dirty="0">
-                <a:hlinkClick r:id="rId17"/>
-              </a:rPr>
-              <a:t>http://kateto.net/networks-r-igraph</a:t>
+              <a:t>https://cran.r-project.org/web/packages/stargazer/vignettes/stargazer.pdf</a:t>
             </a:r>
             <a:endParaRPr lang="en-US" dirty="0"/>
           </a:p>
@@ -10267,7 +10012,7 @@
     </p:spTree>
     <p:extLst>
       <p:ext uri="{BB962C8B-B14F-4D97-AF65-F5344CB8AC3E}">
-        <p14:creationId xmlns:p14="http://schemas.microsoft.com/office/powerpoint/2010/main" val="1260528077"/>
+        <p14:creationId xmlns:p14="http://schemas.microsoft.com/office/powerpoint/2010/main" val="241107658"/>
       </p:ext>
     </p:extLst>
   </p:cSld>
@@ -10296,6 +10041,913 @@
       </p:grpSpPr>
       <p:sp>
         <p:nvSpPr>
+          <p:cNvPr id="2" name="Title 1">
+            <a:extLst>
+              <a:ext uri="{FF2B5EF4-FFF2-40B4-BE49-F238E27FC236}">
+                <a16:creationId xmlns:a16="http://schemas.microsoft.com/office/drawing/2014/main" id="{7BA64387-4D68-4B6B-8A38-128610E12111}"/>
+              </a:ext>
+            </a:extLst>
+          </p:cNvPr>
+          <p:cNvSpPr>
+            <a:spLocks noGrp="1"/>
+          </p:cNvSpPr>
+          <p:nvPr>
+            <p:ph type="title"/>
+          </p:nvPr>
+        </p:nvSpPr>
+        <p:spPr/>
+        <p:txBody>
+          <a:bodyPr/>
+          <a:lstStyle/>
+          <a:p>
+            <a:r>
+              <a:rPr lang="en-US" dirty="0">
+                <a:solidFill>
+                  <a:srgbClr val="3989C9"/>
+                </a:solidFill>
+              </a:rPr>
+              <a:t>R Graphics – Base plots (examples)</a:t>
+            </a:r>
+          </a:p>
+        </p:txBody>
+      </p:sp>
+      <p:pic>
+        <p:nvPicPr>
+          <p:cNvPr id="7" name="Picture 6"/>
+          <p:cNvPicPr>
+            <a:picLocks noChangeAspect="1"/>
+          </p:cNvPicPr>
+          <p:nvPr/>
+        </p:nvPicPr>
+        <p:blipFill>
+          <a:blip r:embed="rId2">
+            <a:extLst>
+              <a:ext uri="{28A0092B-C50C-407E-A947-70E740481C1C}">
+                <a14:useLocalDpi xmlns:a14="http://schemas.microsoft.com/office/drawing/2010/main" val="0"/>
+              </a:ext>
+            </a:extLst>
+          </a:blip>
+          <a:stretch>
+            <a:fillRect/>
+          </a:stretch>
+        </p:blipFill>
+        <p:spPr>
+          <a:xfrm>
+            <a:off x="1022465" y="1467045"/>
+            <a:ext cx="4090662" cy="4542338"/>
+          </a:xfrm>
+          <a:prstGeom prst="rect">
+            <a:avLst/>
+          </a:prstGeom>
+        </p:spPr>
+      </p:pic>
+      <p:pic>
+        <p:nvPicPr>
+          <p:cNvPr id="8" name="Picture 7"/>
+          <p:cNvPicPr>
+            <a:picLocks noChangeAspect="1"/>
+          </p:cNvPicPr>
+          <p:nvPr/>
+        </p:nvPicPr>
+        <p:blipFill>
+          <a:blip r:embed="rId3">
+            <a:extLst>
+              <a:ext uri="{28A0092B-C50C-407E-A947-70E740481C1C}">
+                <a14:useLocalDpi xmlns:a14="http://schemas.microsoft.com/office/drawing/2010/main" val="0"/>
+              </a:ext>
+            </a:extLst>
+          </a:blip>
+          <a:stretch>
+            <a:fillRect/>
+          </a:stretch>
+        </p:blipFill>
+        <p:spPr>
+          <a:xfrm>
+            <a:off x="5694218" y="1603637"/>
+            <a:ext cx="4405746" cy="4405746"/>
+          </a:xfrm>
+          <a:prstGeom prst="rect">
+            <a:avLst/>
+          </a:prstGeom>
+        </p:spPr>
+      </p:pic>
+      <p:sp>
+        <p:nvSpPr>
+          <p:cNvPr id="9" name="TextBox 8">
+            <a:extLst>
+              <a:ext uri="{FF2B5EF4-FFF2-40B4-BE49-F238E27FC236}">
+                <a16:creationId xmlns:a16="http://schemas.microsoft.com/office/drawing/2014/main" id="{2C5DBE70-7FDA-404D-9F97-9475B854D916}"/>
+              </a:ext>
+            </a:extLst>
+          </p:cNvPr>
+          <p:cNvSpPr txBox="1"/>
+          <p:nvPr/>
+        </p:nvSpPr>
+        <p:spPr>
+          <a:xfrm>
+            <a:off x="914399" y="6127234"/>
+            <a:ext cx="6122125" cy="369332"/>
+          </a:xfrm>
+          <a:prstGeom prst="rect">
+            <a:avLst/>
+          </a:prstGeom>
+          <a:noFill/>
+        </p:spPr>
+        <p:txBody>
+          <a:bodyPr wrap="square" rtlCol="0">
+            <a:spAutoFit/>
+          </a:bodyPr>
+          <a:lstStyle/>
+          <a:p>
+            <a:r>
+              <a:rPr lang="en-US" dirty="0">
+                <a:hlinkClick r:id="rId4"/>
+              </a:rPr>
+              <a:t>https://www.stat.auckland.ac.nz/~paul/RG3e/chapter2.html</a:t>
+            </a:r>
+            <a:endParaRPr lang="en-US" dirty="0"/>
+          </a:p>
+        </p:txBody>
+      </p:sp>
+    </p:spTree>
+    <p:extLst>
+      <p:ext uri="{BB962C8B-B14F-4D97-AF65-F5344CB8AC3E}">
+        <p14:creationId xmlns:p14="http://schemas.microsoft.com/office/powerpoint/2010/main" val="1052538369"/>
+      </p:ext>
+    </p:extLst>
+  </p:cSld>
+  <p:clrMapOvr>
+    <a:masterClrMapping/>
+  </p:clrMapOvr>
+</p:sld>
+</file>
+
+<file path=ppt/slides/slide32.xml><?xml version="1.0" encoding="utf-8"?>
+<p:sld xmlns:a="http://schemas.openxmlformats.org/drawingml/2006/main" xmlns:r="http://schemas.openxmlformats.org/officeDocument/2006/relationships" xmlns:p="http://schemas.openxmlformats.org/presentationml/2006/main">
+  <p:cSld>
+    <p:spTree>
+      <p:nvGrpSpPr>
+        <p:cNvPr id="1" name=""/>
+        <p:cNvGrpSpPr/>
+        <p:nvPr/>
+      </p:nvGrpSpPr>
+      <p:grpSpPr>
+        <a:xfrm>
+          <a:off x="0" y="0"/>
+          <a:ext cx="0" cy="0"/>
+          <a:chOff x="0" y="0"/>
+          <a:chExt cx="0" cy="0"/>
+        </a:xfrm>
+      </p:grpSpPr>
+      <p:sp>
+        <p:nvSpPr>
+          <p:cNvPr id="2" name="Title 1">
+            <a:extLst>
+              <a:ext uri="{FF2B5EF4-FFF2-40B4-BE49-F238E27FC236}">
+                <a16:creationId xmlns:a16="http://schemas.microsoft.com/office/drawing/2014/main" id="{7BA64387-4D68-4B6B-8A38-128610E12111}"/>
+              </a:ext>
+            </a:extLst>
+          </p:cNvPr>
+          <p:cNvSpPr>
+            <a:spLocks noGrp="1"/>
+          </p:cNvSpPr>
+          <p:nvPr>
+            <p:ph type="title"/>
+          </p:nvPr>
+        </p:nvSpPr>
+        <p:spPr/>
+        <p:txBody>
+          <a:bodyPr/>
+          <a:lstStyle/>
+          <a:p>
+            <a:r>
+              <a:rPr lang="en-US" dirty="0">
+                <a:solidFill>
+                  <a:srgbClr val="3989C9"/>
+                </a:solidFill>
+              </a:rPr>
+              <a:t>R Graphics – Two Main </a:t>
+            </a:r>
+            <a:r>
+              <a:rPr lang="en-US">
+                <a:solidFill>
+                  <a:srgbClr val="3989C9"/>
+                </a:solidFill>
+              </a:rPr>
+              <a:t>Plotting Systems</a:t>
+            </a:r>
+            <a:endParaRPr lang="en-US" dirty="0">
+              <a:solidFill>
+                <a:srgbClr val="3989C9"/>
+              </a:solidFill>
+            </a:endParaRPr>
+          </a:p>
+        </p:txBody>
+      </p:sp>
+      <p:sp>
+        <p:nvSpPr>
+          <p:cNvPr id="3" name="Content Placeholder 2">
+            <a:extLst>
+              <a:ext uri="{FF2B5EF4-FFF2-40B4-BE49-F238E27FC236}">
+                <a16:creationId xmlns:a16="http://schemas.microsoft.com/office/drawing/2014/main" id="{38FC63AA-1117-4358-896D-E486DF010D1E}"/>
+              </a:ext>
+            </a:extLst>
+          </p:cNvPr>
+          <p:cNvSpPr>
+            <a:spLocks noGrp="1"/>
+          </p:cNvSpPr>
+          <p:nvPr>
+            <p:ph idx="1"/>
+          </p:nvPr>
+        </p:nvSpPr>
+        <p:spPr/>
+        <p:txBody>
+          <a:bodyPr/>
+          <a:lstStyle/>
+          <a:p>
+            <a:r>
+              <a:rPr lang="en-US" dirty="0"/>
+              <a:t>System?</a:t>
+            </a:r>
+          </a:p>
+          <a:p>
+            <a:endParaRPr lang="en-US" dirty="0"/>
+          </a:p>
+          <a:p>
+            <a:r>
+              <a:rPr lang="en-US" dirty="0"/>
+              <a:t>R package: lattice</a:t>
+            </a:r>
+          </a:p>
+          <a:p>
+            <a:pPr lvl="1"/>
+            <a:r>
+              <a:rPr lang="en-US" dirty="0"/>
+              <a:t>implements Trellis system by William Cleveland:</a:t>
+            </a:r>
+          </a:p>
+          <a:p>
+            <a:endParaRPr lang="en-US" dirty="0"/>
+          </a:p>
+          <a:p>
+            <a:r>
+              <a:rPr lang="en-US" dirty="0"/>
+              <a:t>R package: </a:t>
+            </a:r>
+            <a:r>
+              <a:rPr lang="en-US" dirty="0">
+                <a:hlinkClick r:id="rId3"/>
+              </a:rPr>
+              <a:t>ggplot2</a:t>
+            </a:r>
+            <a:endParaRPr lang="en-US" dirty="0"/>
+          </a:p>
+          <a:p>
+            <a:pPr lvl="1"/>
+            <a:r>
+              <a:rPr lang="en-US" dirty="0"/>
+              <a:t>implements "A Grammar of Graphics" by Leland Wilkinson</a:t>
+            </a:r>
+          </a:p>
+          <a:p>
+            <a:pPr lvl="1"/>
+            <a:r>
+              <a:rPr lang="en-US" b="1" dirty="0"/>
+              <a:t>Recommended</a:t>
+            </a:r>
+          </a:p>
+          <a:p>
+            <a:pPr marL="0" indent="0">
+              <a:buNone/>
+            </a:pPr>
+            <a:endParaRPr lang="en-US" dirty="0"/>
+          </a:p>
+          <a:p>
+            <a:pPr lvl="1"/>
+            <a:endParaRPr lang="en-US" dirty="0"/>
+          </a:p>
+          <a:p>
+            <a:pPr lvl="1"/>
+            <a:endParaRPr lang="en-US" dirty="0"/>
+          </a:p>
+          <a:p>
+            <a:endParaRPr lang="en-US" dirty="0"/>
+          </a:p>
+        </p:txBody>
+      </p:sp>
+      <p:sp>
+        <p:nvSpPr>
+          <p:cNvPr id="4" name="TextBox 3">
+            <a:extLst>
+              <a:ext uri="{FF2B5EF4-FFF2-40B4-BE49-F238E27FC236}">
+                <a16:creationId xmlns:a16="http://schemas.microsoft.com/office/drawing/2014/main" id="{2C5DBE70-7FDA-404D-9F97-9475B854D916}"/>
+              </a:ext>
+            </a:extLst>
+          </p:cNvPr>
+          <p:cNvSpPr txBox="1"/>
+          <p:nvPr/>
+        </p:nvSpPr>
+        <p:spPr>
+          <a:xfrm>
+            <a:off x="914399" y="5850235"/>
+            <a:ext cx="6122125" cy="646331"/>
+          </a:xfrm>
+          <a:prstGeom prst="rect">
+            <a:avLst/>
+          </a:prstGeom>
+          <a:noFill/>
+        </p:spPr>
+        <p:txBody>
+          <a:bodyPr wrap="square" rtlCol="0">
+            <a:spAutoFit/>
+          </a:bodyPr>
+          <a:lstStyle/>
+          <a:p>
+            <a:r>
+              <a:rPr lang="en-US" dirty="0">
+                <a:hlinkClick r:id="rId4"/>
+              </a:rPr>
+              <a:t>https://www.stat.auckland.ac.nz/~paul/RG3e/chapter4.html</a:t>
+            </a:r>
+            <a:endParaRPr lang="en-US" dirty="0"/>
+          </a:p>
+          <a:p>
+            <a:r>
+              <a:rPr lang="en-US" dirty="0">
+                <a:hlinkClick r:id="rId5"/>
+              </a:rPr>
+              <a:t>https://www.stat.auckland.ac.nz/~paul/RG3e/chapter5.html</a:t>
+            </a:r>
+            <a:endParaRPr lang="en-US" dirty="0"/>
+          </a:p>
+        </p:txBody>
+      </p:sp>
+      <p:pic>
+        <p:nvPicPr>
+          <p:cNvPr id="5" name="Picture 4"/>
+          <p:cNvPicPr>
+            <a:picLocks noChangeAspect="1"/>
+          </p:cNvPicPr>
+          <p:nvPr/>
+        </p:nvPicPr>
+        <p:blipFill>
+          <a:blip r:embed="rId6">
+            <a:extLst>
+              <a:ext uri="{28A0092B-C50C-407E-A947-70E740481C1C}">
+                <a14:useLocalDpi xmlns:a14="http://schemas.microsoft.com/office/drawing/2010/main" val="0"/>
+              </a:ext>
+            </a:extLst>
+          </a:blip>
+          <a:stretch>
+            <a:fillRect/>
+          </a:stretch>
+        </p:blipFill>
+        <p:spPr>
+          <a:xfrm>
+            <a:off x="7658355" y="1506022"/>
+            <a:ext cx="2344626" cy="2344626"/>
+          </a:xfrm>
+          <a:prstGeom prst="rect">
+            <a:avLst/>
+          </a:prstGeom>
+        </p:spPr>
+      </p:pic>
+      <p:pic>
+        <p:nvPicPr>
+          <p:cNvPr id="6" name="Picture 5"/>
+          <p:cNvPicPr>
+            <a:picLocks noChangeAspect="1"/>
+          </p:cNvPicPr>
+          <p:nvPr/>
+        </p:nvPicPr>
+        <p:blipFill>
+          <a:blip r:embed="rId7">
+            <a:extLst>
+              <a:ext uri="{28A0092B-C50C-407E-A947-70E740481C1C}">
+                <a14:useLocalDpi xmlns:a14="http://schemas.microsoft.com/office/drawing/2010/main" val="0"/>
+              </a:ext>
+            </a:extLst>
+          </a:blip>
+          <a:stretch>
+            <a:fillRect/>
+          </a:stretch>
+        </p:blipFill>
+        <p:spPr>
+          <a:xfrm>
+            <a:off x="8995064" y="3850648"/>
+            <a:ext cx="2651068" cy="2651068"/>
+          </a:xfrm>
+          <a:prstGeom prst="rect">
+            <a:avLst/>
+          </a:prstGeom>
+        </p:spPr>
+      </p:pic>
+    </p:spTree>
+    <p:extLst>
+      <p:ext uri="{BB962C8B-B14F-4D97-AF65-F5344CB8AC3E}">
+        <p14:creationId xmlns:p14="http://schemas.microsoft.com/office/powerpoint/2010/main" val="619026221"/>
+      </p:ext>
+    </p:extLst>
+  </p:cSld>
+  <p:clrMapOvr>
+    <a:masterClrMapping/>
+  </p:clrMapOvr>
+</p:sld>
+</file>
+
+<file path=ppt/slides/slide33.xml><?xml version="1.0" encoding="utf-8"?>
+<p:sld xmlns:a="http://schemas.openxmlformats.org/drawingml/2006/main" xmlns:r="http://schemas.openxmlformats.org/officeDocument/2006/relationships" xmlns:p="http://schemas.openxmlformats.org/presentationml/2006/main">
+  <p:cSld>
+    <p:spTree>
+      <p:nvGrpSpPr>
+        <p:cNvPr id="1" name=""/>
+        <p:cNvGrpSpPr/>
+        <p:nvPr/>
+      </p:nvGrpSpPr>
+      <p:grpSpPr>
+        <a:xfrm>
+          <a:off x="0" y="0"/>
+          <a:ext cx="0" cy="0"/>
+          <a:chOff x="0" y="0"/>
+          <a:chExt cx="0" cy="0"/>
+        </a:xfrm>
+      </p:grpSpPr>
+      <p:pic>
+        <p:nvPicPr>
+          <p:cNvPr id="5" name="Picture 4">
+            <a:extLst>
+              <a:ext uri="{FF2B5EF4-FFF2-40B4-BE49-F238E27FC236}">
+                <a16:creationId xmlns:a16="http://schemas.microsoft.com/office/drawing/2014/main" id="{46C5D4C3-730C-4869-927A-0E5F42CEF67E}"/>
+              </a:ext>
+            </a:extLst>
+          </p:cNvPr>
+          <p:cNvPicPr>
+            <a:picLocks noChangeAspect="1"/>
+          </p:cNvPicPr>
+          <p:nvPr/>
+        </p:nvPicPr>
+        <p:blipFill>
+          <a:blip r:embed="rId2"/>
+          <a:stretch>
+            <a:fillRect/>
+          </a:stretch>
+        </p:blipFill>
+        <p:spPr>
+          <a:xfrm>
+            <a:off x="1025539" y="3771343"/>
+            <a:ext cx="3413559" cy="1973286"/>
+          </a:xfrm>
+          <a:prstGeom prst="rect">
+            <a:avLst/>
+          </a:prstGeom>
+        </p:spPr>
+      </p:pic>
+      <p:sp>
+        <p:nvSpPr>
+          <p:cNvPr id="8" name="TextBox 7">
+            <a:extLst>
+              <a:ext uri="{FF2B5EF4-FFF2-40B4-BE49-F238E27FC236}">
+                <a16:creationId xmlns:a16="http://schemas.microsoft.com/office/drawing/2014/main" id="{2C5DBE70-7FDA-404D-9F97-9475B854D916}"/>
+              </a:ext>
+            </a:extLst>
+          </p:cNvPr>
+          <p:cNvSpPr txBox="1"/>
+          <p:nvPr/>
+        </p:nvSpPr>
+        <p:spPr>
+          <a:xfrm>
+            <a:off x="1353586" y="5711378"/>
+            <a:ext cx="3108961" cy="923330"/>
+          </a:xfrm>
+          <a:prstGeom prst="rect">
+            <a:avLst/>
+          </a:prstGeom>
+          <a:noFill/>
+        </p:spPr>
+        <p:txBody>
+          <a:bodyPr wrap="square" rtlCol="0">
+            <a:spAutoFit/>
+          </a:bodyPr>
+          <a:lstStyle/>
+          <a:p>
+            <a:r>
+              <a:rPr lang="en-US" dirty="0"/>
+              <a:t>3D tri-surface interactive plot using the </a:t>
+            </a:r>
+            <a:r>
+              <a:rPr lang="en-US" dirty="0" err="1"/>
+              <a:t>plotly</a:t>
+            </a:r>
+            <a:r>
+              <a:rPr lang="en-US" dirty="0"/>
+              <a:t> package</a:t>
+            </a:r>
+          </a:p>
+          <a:p>
+            <a:r>
+              <a:rPr lang="en-US" dirty="0">
+                <a:hlinkClick r:id="rId3"/>
+              </a:rPr>
+              <a:t>https://plot.ly/r/trisurf/</a:t>
+            </a:r>
+            <a:endParaRPr lang="en-US" dirty="0"/>
+          </a:p>
+        </p:txBody>
+      </p:sp>
+      <p:sp>
+        <p:nvSpPr>
+          <p:cNvPr id="2" name="Title 1">
+            <a:extLst>
+              <a:ext uri="{FF2B5EF4-FFF2-40B4-BE49-F238E27FC236}">
+                <a16:creationId xmlns:a16="http://schemas.microsoft.com/office/drawing/2014/main" id="{12332406-F5D3-48A4-A938-2AEE57703D73}"/>
+              </a:ext>
+            </a:extLst>
+          </p:cNvPr>
+          <p:cNvSpPr>
+            <a:spLocks noGrp="1"/>
+          </p:cNvSpPr>
+          <p:nvPr>
+            <p:ph type="title"/>
+          </p:nvPr>
+        </p:nvSpPr>
+        <p:spPr/>
+        <p:txBody>
+          <a:bodyPr/>
+          <a:lstStyle/>
+          <a:p>
+            <a:r>
+              <a:rPr lang="en-US" dirty="0"/>
+              <a:t>Other Specialized Plots</a:t>
+            </a:r>
+          </a:p>
+        </p:txBody>
+      </p:sp>
+      <p:sp>
+        <p:nvSpPr>
+          <p:cNvPr id="3" name="Content Placeholder 2">
+            <a:extLst>
+              <a:ext uri="{FF2B5EF4-FFF2-40B4-BE49-F238E27FC236}">
+                <a16:creationId xmlns:a16="http://schemas.microsoft.com/office/drawing/2014/main" id="{3CC0CD8E-594A-47CD-AD0A-9D561B6C3613}"/>
+              </a:ext>
+            </a:extLst>
+          </p:cNvPr>
+          <p:cNvSpPr>
+            <a:spLocks noGrp="1"/>
+          </p:cNvSpPr>
+          <p:nvPr>
+            <p:ph idx="1"/>
+          </p:nvPr>
+        </p:nvSpPr>
+        <p:spPr/>
+        <p:txBody>
+          <a:bodyPr/>
+          <a:lstStyle/>
+          <a:p>
+            <a:r>
+              <a:rPr lang="en-US" dirty="0"/>
+              <a:t>Graphic functions provided by specialized packages</a:t>
+            </a:r>
+          </a:p>
+          <a:p>
+            <a:pPr lvl="1"/>
+            <a:r>
+              <a:rPr lang="en-US" dirty="0"/>
+              <a:t>Based on R primitive graphical engines like </a:t>
+            </a:r>
+            <a:r>
+              <a:rPr lang="en-US" dirty="0">
+                <a:hlinkClick r:id="rId4"/>
+              </a:rPr>
+              <a:t>grid</a:t>
+            </a:r>
+            <a:r>
+              <a:rPr lang="en-US" dirty="0"/>
+              <a:t> (</a:t>
+            </a:r>
+            <a:r>
+              <a:rPr lang="en-US" dirty="0" err="1"/>
+              <a:t>eg</a:t>
+            </a:r>
+            <a:r>
+              <a:rPr lang="en-US" dirty="0"/>
+              <a:t>. plot() in </a:t>
+            </a:r>
+            <a:r>
+              <a:rPr lang="en-US" dirty="0">
+                <a:hlinkClick r:id="rId5"/>
+              </a:rPr>
+              <a:t>party</a:t>
+            </a:r>
+            <a:r>
+              <a:rPr lang="en-US" dirty="0"/>
+              <a:t>, </a:t>
+            </a:r>
+            <a:r>
+              <a:rPr lang="en-US" dirty="0" err="1">
+                <a:hlinkClick r:id="rId6"/>
+              </a:rPr>
+              <a:t>igraph</a:t>
+            </a:r>
+            <a:r>
+              <a:rPr lang="en-US" dirty="0"/>
+              <a:t>)</a:t>
+            </a:r>
+          </a:p>
+          <a:p>
+            <a:pPr lvl="1"/>
+            <a:r>
+              <a:rPr lang="en-US" dirty="0"/>
+              <a:t>Following a plotting system (</a:t>
+            </a:r>
+            <a:r>
+              <a:rPr lang="en-US" dirty="0" err="1"/>
+              <a:t>eg</a:t>
+            </a:r>
+            <a:r>
+              <a:rPr lang="en-US" dirty="0"/>
+              <a:t>. </a:t>
+            </a:r>
+            <a:r>
+              <a:rPr lang="en-US" dirty="0" err="1">
+                <a:hlinkClick r:id="rId7"/>
+              </a:rPr>
+              <a:t>ggmap</a:t>
+            </a:r>
+            <a:r>
+              <a:rPr lang="en-US" dirty="0"/>
+              <a:t>, </a:t>
+            </a:r>
+            <a:r>
+              <a:rPr lang="en-US" dirty="0" err="1">
+                <a:hlinkClick r:id="rId8"/>
+              </a:rPr>
+              <a:t>tmap</a:t>
+            </a:r>
+            <a:r>
+              <a:rPr lang="en-US" dirty="0"/>
+              <a:t>, </a:t>
+            </a:r>
+            <a:r>
+              <a:rPr lang="en-US" dirty="0" err="1">
+                <a:hlinkClick r:id="rId9"/>
+              </a:rPr>
+              <a:t>gganimate</a:t>
+            </a:r>
+            <a:r>
+              <a:rPr lang="en-US" dirty="0"/>
+              <a:t>, </a:t>
+            </a:r>
+            <a:r>
+              <a:rPr lang="en-US" dirty="0" err="1">
+                <a:hlinkClick r:id="rId10"/>
+              </a:rPr>
+              <a:t>plotly</a:t>
+            </a:r>
+            <a:r>
+              <a:rPr lang="en-US" dirty="0"/>
+              <a:t>, etc.)</a:t>
+            </a:r>
+          </a:p>
+          <a:p>
+            <a:pPr lvl="1"/>
+            <a:r>
+              <a:rPr lang="en-US" dirty="0"/>
+              <a:t>Wrapper of plotting tools in another languages (ex. </a:t>
+            </a:r>
+            <a:r>
+              <a:rPr lang="en-US" dirty="0">
+                <a:hlinkClick r:id="rId11"/>
+              </a:rPr>
+              <a:t>leaflet</a:t>
+            </a:r>
+            <a:r>
+              <a:rPr lang="en-US" dirty="0"/>
+              <a:t>, </a:t>
+            </a:r>
+            <a:r>
+              <a:rPr lang="en-US" dirty="0" err="1">
+                <a:hlinkClick r:id="rId12"/>
+              </a:rPr>
+              <a:t>grViz</a:t>
+            </a:r>
+            <a:r>
+              <a:rPr lang="en-US" dirty="0">
+                <a:hlinkClick r:id="rId12"/>
+              </a:rPr>
+              <a:t>()</a:t>
+            </a:r>
+            <a:r>
+              <a:rPr lang="en-US" dirty="0"/>
+              <a:t> in  </a:t>
+            </a:r>
+            <a:r>
+              <a:rPr lang="en-US" dirty="0" err="1">
+                <a:hlinkClick r:id="rId13"/>
+              </a:rPr>
+              <a:t>DiagrammeR</a:t>
+            </a:r>
+            <a:r>
+              <a:rPr lang="en-US" dirty="0"/>
+              <a:t>)</a:t>
+            </a:r>
+          </a:p>
+          <a:p>
+            <a:pPr lvl="1"/>
+            <a:endParaRPr lang="en-US" dirty="0"/>
+          </a:p>
+          <a:p>
+            <a:endParaRPr lang="en-US" dirty="0"/>
+          </a:p>
+        </p:txBody>
+      </p:sp>
+      <p:sp>
+        <p:nvSpPr>
+          <p:cNvPr id="6" name="TextBox 5">
+            <a:extLst>
+              <a:ext uri="{FF2B5EF4-FFF2-40B4-BE49-F238E27FC236}">
+                <a16:creationId xmlns:a16="http://schemas.microsoft.com/office/drawing/2014/main" id="{2C5DBE70-7FDA-404D-9F97-9475B854D916}"/>
+              </a:ext>
+            </a:extLst>
+          </p:cNvPr>
+          <p:cNvSpPr txBox="1"/>
+          <p:nvPr/>
+        </p:nvSpPr>
+        <p:spPr>
+          <a:xfrm>
+            <a:off x="4439098" y="5728003"/>
+            <a:ext cx="3890357" cy="923330"/>
+          </a:xfrm>
+          <a:prstGeom prst="rect">
+            <a:avLst/>
+          </a:prstGeom>
+          <a:noFill/>
+        </p:spPr>
+        <p:txBody>
+          <a:bodyPr wrap="square" rtlCol="0">
+            <a:spAutoFit/>
+          </a:bodyPr>
+          <a:lstStyle/>
+          <a:p>
+            <a:r>
+              <a:rPr lang="en-US" dirty="0"/>
+              <a:t>Decision tree plot using party package</a:t>
+            </a:r>
+          </a:p>
+          <a:p>
+            <a:r>
+              <a:rPr lang="en-US" dirty="0">
+                <a:hlinkClick r:id="rId14"/>
+              </a:rPr>
+              <a:t>https://www.statmethods.net/advstats/cart.html</a:t>
+            </a:r>
+            <a:endParaRPr lang="en-US" dirty="0"/>
+          </a:p>
+        </p:txBody>
+      </p:sp>
+      <p:pic>
+        <p:nvPicPr>
+          <p:cNvPr id="10" name="Picture 9"/>
+          <p:cNvPicPr>
+            <a:picLocks noChangeAspect="1"/>
+          </p:cNvPicPr>
+          <p:nvPr/>
+        </p:nvPicPr>
+        <p:blipFill>
+          <a:blip r:embed="rId15">
+            <a:extLst>
+              <a:ext uri="{28A0092B-C50C-407E-A947-70E740481C1C}">
+                <a14:useLocalDpi xmlns:a14="http://schemas.microsoft.com/office/drawing/2010/main" val="0"/>
+              </a:ext>
+            </a:extLst>
+          </a:blip>
+          <a:stretch>
+            <a:fillRect/>
+          </a:stretch>
+        </p:blipFill>
+        <p:spPr>
+          <a:xfrm>
+            <a:off x="5197381" y="3654757"/>
+            <a:ext cx="2089872" cy="2089872"/>
+          </a:xfrm>
+          <a:prstGeom prst="rect">
+            <a:avLst/>
+          </a:prstGeom>
+        </p:spPr>
+      </p:pic>
+      <p:pic>
+        <p:nvPicPr>
+          <p:cNvPr id="15" name="Picture 14"/>
+          <p:cNvPicPr>
+            <a:picLocks noChangeAspect="1"/>
+          </p:cNvPicPr>
+          <p:nvPr/>
+        </p:nvPicPr>
+        <p:blipFill>
+          <a:blip r:embed="rId16">
+            <a:extLst>
+              <a:ext uri="{28A0092B-C50C-407E-A947-70E740481C1C}">
+                <a14:useLocalDpi xmlns:a14="http://schemas.microsoft.com/office/drawing/2010/main" val="0"/>
+              </a:ext>
+            </a:extLst>
+          </a:blip>
+          <a:stretch>
+            <a:fillRect/>
+          </a:stretch>
+        </p:blipFill>
+        <p:spPr>
+          <a:xfrm>
+            <a:off x="8222653" y="3712946"/>
+            <a:ext cx="2743220" cy="2009790"/>
+          </a:xfrm>
+          <a:prstGeom prst="rect">
+            <a:avLst/>
+          </a:prstGeom>
+        </p:spPr>
+      </p:pic>
+      <p:sp>
+        <p:nvSpPr>
+          <p:cNvPr id="16" name="TextBox 15">
+            <a:extLst>
+              <a:ext uri="{FF2B5EF4-FFF2-40B4-BE49-F238E27FC236}">
+                <a16:creationId xmlns:a16="http://schemas.microsoft.com/office/drawing/2014/main" id="{2C5DBE70-7FDA-404D-9F97-9475B854D916}"/>
+              </a:ext>
+            </a:extLst>
+          </p:cNvPr>
+          <p:cNvSpPr txBox="1"/>
+          <p:nvPr/>
+        </p:nvSpPr>
+        <p:spPr>
+          <a:xfrm>
+            <a:off x="8222653" y="5728540"/>
+            <a:ext cx="3556921" cy="646331"/>
+          </a:xfrm>
+          <a:prstGeom prst="rect">
+            <a:avLst/>
+          </a:prstGeom>
+          <a:noFill/>
+        </p:spPr>
+        <p:txBody>
+          <a:bodyPr wrap="square" rtlCol="0">
+            <a:spAutoFit/>
+          </a:bodyPr>
+          <a:lstStyle/>
+          <a:p>
+            <a:r>
+              <a:rPr lang="en-US" dirty="0"/>
+              <a:t>Network plot using </a:t>
+            </a:r>
+            <a:r>
+              <a:rPr lang="en-US" dirty="0" err="1"/>
+              <a:t>igraph</a:t>
+            </a:r>
+            <a:r>
+              <a:rPr lang="en-US" dirty="0"/>
+              <a:t> package</a:t>
+            </a:r>
+          </a:p>
+          <a:p>
+            <a:r>
+              <a:rPr lang="en-US" dirty="0">
+                <a:hlinkClick r:id="rId17"/>
+              </a:rPr>
+              <a:t>http://kateto.net/networks-r-igraph</a:t>
+            </a:r>
+            <a:endParaRPr lang="en-US" dirty="0"/>
+          </a:p>
+        </p:txBody>
+      </p:sp>
+    </p:spTree>
+    <p:extLst>
+      <p:ext uri="{BB962C8B-B14F-4D97-AF65-F5344CB8AC3E}">
+        <p14:creationId xmlns:p14="http://schemas.microsoft.com/office/powerpoint/2010/main" val="1260528077"/>
+      </p:ext>
+    </p:extLst>
+  </p:cSld>
+  <p:clrMapOvr>
+    <a:masterClrMapping/>
+  </p:clrMapOvr>
+</p:sld>
+</file>
+
+<file path=ppt/slides/slide34.xml><?xml version="1.0" encoding="utf-8"?>
+<p:sld xmlns:a="http://schemas.openxmlformats.org/drawingml/2006/main" xmlns:r="http://schemas.openxmlformats.org/officeDocument/2006/relationships" xmlns:p="http://schemas.openxmlformats.org/presentationml/2006/main">
+  <p:cSld>
+    <p:spTree>
+      <p:nvGrpSpPr>
+        <p:cNvPr id="1" name=""/>
+        <p:cNvGrpSpPr/>
+        <p:nvPr/>
+      </p:nvGrpSpPr>
+      <p:grpSpPr>
+        <a:xfrm>
+          <a:off x="0" y="0"/>
+          <a:ext cx="0" cy="0"/>
+          <a:chOff x="0" y="0"/>
+          <a:chExt cx="0" cy="0"/>
+        </a:xfrm>
+      </p:grpSpPr>
+      <p:sp>
+        <p:nvSpPr>
           <p:cNvPr id="2" name="Title 1"/>
           <p:cNvSpPr>
             <a:spLocks noGrp="1"/>
@@ -10457,7 +11109,7 @@
 </p:sld>
 </file>
 
-<file path=ppt/slides/slide32.xml><?xml version="1.0" encoding="utf-8"?>
+<file path=ppt/slides/slide35.xml><?xml version="1.0" encoding="utf-8"?>
 <p:sld xmlns:a="http://schemas.openxmlformats.org/drawingml/2006/main" xmlns:r="http://schemas.openxmlformats.org/officeDocument/2006/relationships" xmlns:p="http://schemas.openxmlformats.org/presentationml/2006/main">
   <p:cSld>
     <p:spTree>
@@ -10709,7 +11361,7 @@
 </p:sld>
 </file>
 
-<file path=ppt/slides/slide33.xml><?xml version="1.0" encoding="utf-8"?>
+<file path=ppt/slides/slide36.xml><?xml version="1.0" encoding="utf-8"?>
 <p:sld xmlns:a="http://schemas.openxmlformats.org/drawingml/2006/main" xmlns:r="http://schemas.openxmlformats.org/officeDocument/2006/relationships" xmlns:p="http://schemas.openxmlformats.org/presentationml/2006/main">
   <p:cSld>
     <p:spTree>
@@ -10850,7 +11502,7 @@
 </p:sld>
 </file>
 
-<file path=ppt/slides/slide34.xml><?xml version="1.0" encoding="utf-8"?>
+<file path=ppt/slides/slide37.xml><?xml version="1.0" encoding="utf-8"?>
 <p:sld xmlns:a="http://schemas.openxmlformats.org/drawingml/2006/main" xmlns:r="http://schemas.openxmlformats.org/officeDocument/2006/relationships" xmlns:p="http://schemas.openxmlformats.org/presentationml/2006/main">
   <p:cSld>
     <p:spTree>

</xml_diff>

<commit_message>
fixed a few url links in slides
</commit_message>
<xml_diff>
--- a/r_intro_researchers.pptx
+++ b/r_intro_researchers.pptx
@@ -154,7 +154,7 @@
 <file path=ppt/revisionInfo.xml><?xml version="1.0" encoding="utf-8"?>
 <p1510:revInfo xmlns:a="http://schemas.openxmlformats.org/drawingml/2006/main" xmlns:r="http://schemas.openxmlformats.org/officeDocument/2006/relationships" xmlns:p1510="http://schemas.microsoft.com/office/powerpoint/2015/10/main">
   <p1510:revLst>
-    <p1510:client id="{D49F36B8-B0A8-4276-A422-B8773EAD8204}" v="2" dt="2019-09-24T21:03:53.258"/>
+    <p1510:client id="{D49F36B8-B0A8-4276-A422-B8773EAD8204}" v="12" dt="2019-10-01T15:21:04.241"/>
   </p1510:revLst>
 </p1510:revInfo>
 </file>
@@ -167,7 +167,7 @@
   <pc:docChgLst>
     <pc:chgData name="Jay Cao" userId="24e21172780c2dbf" providerId="LiveId" clId="{D49F36B8-B0A8-4276-A422-B8773EAD8204}"/>
     <pc:docChg chg="custSel modSld">
-      <pc:chgData name="Jay Cao" userId="24e21172780c2dbf" providerId="LiveId" clId="{D49F36B8-B0A8-4276-A422-B8773EAD8204}" dt="2019-09-24T21:03:53.257" v="31"/>
+      <pc:chgData name="Jay Cao" userId="24e21172780c2dbf" providerId="LiveId" clId="{D49F36B8-B0A8-4276-A422-B8773EAD8204}" dt="2019-10-01T15:20:28.538" v="34" actId="207"/>
       <pc:docMkLst>
         <pc:docMk/>
       </pc:docMkLst>
@@ -197,6 +197,21 @@
           <ac:spMkLst>
             <pc:docMk/>
             <pc:sldMk cId="939559567" sldId="295"/>
+            <ac:spMk id="3" creationId="{00000000-0000-0000-0000-000000000000}"/>
+          </ac:spMkLst>
+        </pc:spChg>
+      </pc:sldChg>
+      <pc:sldChg chg="modSp">
+        <pc:chgData name="Jay Cao" userId="24e21172780c2dbf" providerId="LiveId" clId="{D49F36B8-B0A8-4276-A422-B8773EAD8204}" dt="2019-10-01T15:20:28.538" v="34" actId="207"/>
+        <pc:sldMkLst>
+          <pc:docMk/>
+          <pc:sldMk cId="1359506617" sldId="304"/>
+        </pc:sldMkLst>
+        <pc:spChg chg="mod">
+          <ac:chgData name="Jay Cao" userId="24e21172780c2dbf" providerId="LiveId" clId="{D49F36B8-B0A8-4276-A422-B8773EAD8204}" dt="2019-10-01T15:20:28.538" v="34" actId="207"/>
+          <ac:spMkLst>
+            <pc:docMk/>
+            <pc:sldMk cId="1359506617" sldId="304"/>
             <ac:spMk id="3" creationId="{00000000-0000-0000-0000-000000000000}"/>
           </ac:spMkLst>
         </pc:spChg>
@@ -291,7 +306,7 @@
           <a:p>
             <a:fld id="{0A9A628E-7277-4438-8DF0-5778D2FD5FD3}" type="datetimeFigureOut">
               <a:rPr lang="en-US" smtClean="0"/>
-              <a:t>9/25/2019</a:t>
+              <a:t>10/1/2019</a:t>
             </a:fld>
             <a:endParaRPr lang="en-US"/>
           </a:p>
@@ -873,7 +888,7 @@
           <a:p>
             <a:fld id="{2E9B9F13-826C-4D2E-B836-5B52099325F3}" type="datetimeFigureOut">
               <a:rPr lang="en-US" smtClean="0"/>
-              <a:t>9/25/2019</a:t>
+              <a:t>10/1/2019</a:t>
             </a:fld>
             <a:endParaRPr lang="en-US"/>
           </a:p>
@@ -1071,7 +1086,7 @@
           <a:p>
             <a:fld id="{2E9B9F13-826C-4D2E-B836-5B52099325F3}" type="datetimeFigureOut">
               <a:rPr lang="en-US" smtClean="0"/>
-              <a:t>9/25/2019</a:t>
+              <a:t>10/1/2019</a:t>
             </a:fld>
             <a:endParaRPr lang="en-US"/>
           </a:p>
@@ -1279,7 +1294,7 @@
           <a:p>
             <a:fld id="{2E9B9F13-826C-4D2E-B836-5B52099325F3}" type="datetimeFigureOut">
               <a:rPr lang="en-US" smtClean="0"/>
-              <a:t>9/25/2019</a:t>
+              <a:t>10/1/2019</a:t>
             </a:fld>
             <a:endParaRPr lang="en-US"/>
           </a:p>
@@ -1604,7 +1619,7 @@
             <a:fld id="{56ED6557-8EC6-45FC-B359-5D206E9600ED}" type="datetime1">
               <a:rPr lang="en-US" smtClean="0"/>
               <a:pPr/>
-              <a:t>9/25/2019</a:t>
+              <a:t>10/1/2019</a:t>
             </a:fld>
             <a:endParaRPr lang="en-US" dirty="0"/>
           </a:p>
@@ -1881,7 +1896,7 @@
           <a:p>
             <a:fld id="{2E9B9F13-826C-4D2E-B836-5B52099325F3}" type="datetimeFigureOut">
               <a:rPr lang="en-US" smtClean="0"/>
-              <a:t>9/25/2019</a:t>
+              <a:t>10/1/2019</a:t>
             </a:fld>
             <a:endParaRPr lang="en-US"/>
           </a:p>
@@ -2156,7 +2171,7 @@
           <a:p>
             <a:fld id="{2E9B9F13-826C-4D2E-B836-5B52099325F3}" type="datetimeFigureOut">
               <a:rPr lang="en-US" smtClean="0"/>
-              <a:t>9/25/2019</a:t>
+              <a:t>10/1/2019</a:t>
             </a:fld>
             <a:endParaRPr lang="en-US"/>
           </a:p>
@@ -2421,7 +2436,7 @@
           <a:p>
             <a:fld id="{2E9B9F13-826C-4D2E-B836-5B52099325F3}" type="datetimeFigureOut">
               <a:rPr lang="en-US" smtClean="0"/>
-              <a:t>9/25/2019</a:t>
+              <a:t>10/1/2019</a:t>
             </a:fld>
             <a:endParaRPr lang="en-US"/>
           </a:p>
@@ -2833,7 +2848,7 @@
           <a:p>
             <a:fld id="{2E9B9F13-826C-4D2E-B836-5B52099325F3}" type="datetimeFigureOut">
               <a:rPr lang="en-US" smtClean="0"/>
-              <a:t>9/25/2019</a:t>
+              <a:t>10/1/2019</a:t>
             </a:fld>
             <a:endParaRPr lang="en-US"/>
           </a:p>
@@ -2974,7 +2989,7 @@
           <a:p>
             <a:fld id="{2E9B9F13-826C-4D2E-B836-5B52099325F3}" type="datetimeFigureOut">
               <a:rPr lang="en-US" smtClean="0"/>
-              <a:t>9/25/2019</a:t>
+              <a:t>10/1/2019</a:t>
             </a:fld>
             <a:endParaRPr lang="en-US"/>
           </a:p>
@@ -3087,7 +3102,7 @@
           <a:p>
             <a:fld id="{2E9B9F13-826C-4D2E-B836-5B52099325F3}" type="datetimeFigureOut">
               <a:rPr lang="en-US" smtClean="0"/>
-              <a:t>9/25/2019</a:t>
+              <a:t>10/1/2019</a:t>
             </a:fld>
             <a:endParaRPr lang="en-US"/>
           </a:p>
@@ -3398,7 +3413,7 @@
           <a:p>
             <a:fld id="{2E9B9F13-826C-4D2E-B836-5B52099325F3}" type="datetimeFigureOut">
               <a:rPr lang="en-US" smtClean="0"/>
-              <a:t>9/25/2019</a:t>
+              <a:t>10/1/2019</a:t>
             </a:fld>
             <a:endParaRPr lang="en-US"/>
           </a:p>
@@ -3686,7 +3701,7 @@
           <a:p>
             <a:fld id="{2E9B9F13-826C-4D2E-B836-5B52099325F3}" type="datetimeFigureOut">
               <a:rPr lang="en-US" smtClean="0"/>
-              <a:t>9/25/2019</a:t>
+              <a:t>10/1/2019</a:t>
             </a:fld>
             <a:endParaRPr lang="en-US"/>
           </a:p>
@@ -3927,7 +3942,7 @@
           <a:p>
             <a:fld id="{2E9B9F13-826C-4D2E-B836-5B52099325F3}" type="datetimeFigureOut">
               <a:rPr lang="en-US" smtClean="0"/>
-              <a:t>9/25/2019</a:t>
+              <a:t>10/1/2019</a:t>
             </a:fld>
             <a:endParaRPr lang="en-US"/>
           </a:p>
@@ -4419,7 +4434,7 @@
                 </a:solidFill>
                 <a:latin typeface="+mj-lt"/>
               </a:rPr>
-              <a:t>September 25, 2019</a:t>
+              <a:t>October 1, 2019</a:t>
             </a:fld>
             <a:r>
               <a:rPr lang="en-CA" sz="1400" b="1" dirty="0">
@@ -4478,7 +4493,7 @@
                 <a:hlinkClick r:id="rId2">
                   <a:extLst>
                     <a:ext uri="{A12FA001-AC4F-418D-AE19-62706E023703}">
-                      <ahyp:hlinkClr xmlns:ahyp="http://schemas.microsoft.com/office/drawing/2018/hyperlinkcolor" xmlns="" val="tx"/>
+                      <ahyp:hlinkClr xmlns:ahyp="http://schemas.microsoft.com/office/drawing/2018/hyperlinkcolor" val="tx"/>
                     </a:ext>
                   </a:extLst>
                 </a:hlinkClick>
@@ -7800,7 +7815,7 @@
             <a:r>
               <a:rPr lang="en-CA" dirty="0">
                 <a:latin typeface="Consolas" panose="020B0609020204030204" pitchFamily="49" charset="0"/>
-                <a:hlinkClick r:id="rId5"/>
+                <a:hlinkClick r:id="rId7"/>
               </a:rPr>
               <a:t>select()</a:t>
             </a:r>
@@ -7811,7 +7826,7 @@
             <a:r>
               <a:rPr lang="en-CA" dirty="0">
                 <a:latin typeface="Consolas" panose="020B0609020204030204" pitchFamily="49" charset="0"/>
-                <a:hlinkClick r:id="rId7"/>
+                <a:hlinkClick r:id="rId8"/>
               </a:rPr>
               <a:t>filter()</a:t>
             </a:r>
@@ -7846,7 +7861,7 @@
             <a:r>
               <a:rPr lang="en-CA" dirty="0">
                 <a:latin typeface="Consolas" panose="020B0609020204030204" pitchFamily="49" charset="0"/>
-                <a:hlinkClick r:id="rId8"/>
+                <a:hlinkClick r:id="rId9"/>
               </a:rPr>
               <a:t>lm()</a:t>
             </a:r>
@@ -7874,14 +7889,14 @@
             <a:r>
               <a:rPr lang="en-CA" dirty="0" err="1">
                 <a:latin typeface="Consolas" panose="020B0609020204030204" pitchFamily="49" charset="0"/>
-                <a:hlinkClick r:id="rId9"/>
+                <a:hlinkClick r:id="rId10"/>
               </a:rPr>
               <a:t>ivreg</a:t>
             </a:r>
             <a:r>
               <a:rPr lang="en-CA" dirty="0">
                 <a:latin typeface="Consolas" panose="020B0609020204030204" pitchFamily="49" charset="0"/>
-                <a:hlinkClick r:id="rId9"/>
+                <a:hlinkClick r:id="rId10"/>
               </a:rPr>
               <a:t>()</a:t>
             </a:r>
@@ -7892,7 +7907,7 @@
             <a:r>
               <a:rPr lang="en-CA" dirty="0">
                 <a:latin typeface="Consolas" panose="020B0609020204030204" pitchFamily="49" charset="0"/>
-                <a:hlinkClick r:id="rId10"/>
+                <a:hlinkClick r:id="rId11"/>
               </a:rPr>
               <a:t>AER</a:t>
             </a:r>
@@ -7916,7 +7931,7 @@
             <a:r>
               <a:rPr lang="en-CA" dirty="0">
                 <a:latin typeface="Consolas" panose="020B0609020204030204" pitchFamily="49" charset="0"/>
-                <a:hlinkClick r:id="rId11"/>
+                <a:hlinkClick r:id="rId12"/>
               </a:rPr>
               <a:t>stargazer()</a:t>
             </a:r>
@@ -7927,7 +7942,7 @@
             <a:r>
               <a:rPr lang="en-CA" dirty="0">
                 <a:latin typeface="Consolas" panose="020B0609020204030204" pitchFamily="49" charset="0"/>
-                <a:hlinkClick r:id="rId12"/>
+                <a:hlinkClick r:id="rId13"/>
               </a:rPr>
               <a:t>stargazer</a:t>
             </a:r>
@@ -8524,9 +8539,22 @@
                   <a:srgbClr val="FF0000"/>
                 </a:solidFill>
                 <a:latin typeface="Consolas" panose="020B0609020204030204" pitchFamily="49" charset="0"/>
+                <a:hlinkClick r:id="rId3">
+                  <a:extLst>
+                    <a:ext uri="{A12FA001-AC4F-418D-AE19-62706E023703}">
+                      <ahyp:hlinkClr xmlns:ahyp="http://schemas.microsoft.com/office/drawing/2018/hyperlinkcolor" val="tx"/>
+                    </a:ext>
+                  </a:extLst>
+                </a:hlinkClick>
               </a:rPr>
               <a:t>filter()</a:t>
             </a:r>
+            <a:endParaRPr lang="en-CA" sz="2400" b="1" dirty="0">
+              <a:solidFill>
+                <a:srgbClr val="FF0000"/>
+              </a:solidFill>
+              <a:latin typeface="Consolas" panose="020B0609020204030204" pitchFamily="49" charset="0"/>
+            </a:endParaRPr>
           </a:p>
           <a:p>
             <a:r>
@@ -8539,9 +8567,22 @@
                   <a:srgbClr val="FF0000"/>
                 </a:solidFill>
                 <a:latin typeface="Consolas" panose="020B0609020204030204" pitchFamily="49" charset="0"/>
+                <a:hlinkClick r:id="rId4">
+                  <a:extLst>
+                    <a:ext uri="{A12FA001-AC4F-418D-AE19-62706E023703}">
+                      <ahyp:hlinkClr xmlns:ahyp="http://schemas.microsoft.com/office/drawing/2018/hyperlinkcolor" val="tx"/>
+                    </a:ext>
+                  </a:extLst>
+                </a:hlinkClick>
               </a:rPr>
               <a:t>select()</a:t>
             </a:r>
+            <a:endParaRPr lang="en-CA" sz="2400" b="1" dirty="0">
+              <a:solidFill>
+                <a:srgbClr val="FF0000"/>
+              </a:solidFill>
+              <a:latin typeface="Consolas" panose="020B0609020204030204" pitchFamily="49" charset="0"/>
+            </a:endParaRPr>
           </a:p>
           <a:p>
             <a:r>
@@ -8566,9 +8607,22 @@
                   <a:srgbClr val="FF0000"/>
                 </a:solidFill>
                 <a:latin typeface="Consolas" panose="020B0609020204030204" pitchFamily="49" charset="0"/>
+                <a:hlinkClick r:id="rId5">
+                  <a:extLst>
+                    <a:ext uri="{A12FA001-AC4F-418D-AE19-62706E023703}">
+                      <ahyp:hlinkClr xmlns:ahyp="http://schemas.microsoft.com/office/drawing/2018/hyperlinkcolor" val="tx"/>
+                    </a:ext>
+                  </a:extLst>
+                </a:hlinkClick>
               </a:rPr>
               <a:t>mutate()</a:t>
             </a:r>
+            <a:endParaRPr lang="en-CA" sz="2400" b="1" dirty="0">
+              <a:solidFill>
+                <a:srgbClr val="FF0000"/>
+              </a:solidFill>
+              <a:latin typeface="Consolas" panose="020B0609020204030204" pitchFamily="49" charset="0"/>
+            </a:endParaRPr>
           </a:p>
           <a:p>
             <a:r>
@@ -8653,10 +8707,9 @@
           <a:lstStyle/>
           <a:p>
             <a:r>
-              <a:rPr lang="en-CA" dirty="0" smtClean="0"/>
+              <a:rPr lang="en-CA" dirty="0"/>
               <a:t>Data Pipe (%&gt;%)</a:t>
             </a:r>
-            <a:endParaRPr lang="en-CA" dirty="0"/>
           </a:p>
         </p:txBody>
       </p:sp>
@@ -8699,7 +8752,7 @@
               <a:t>setosa</a:t>
             </a:r>
             <a:r>
-              <a:rPr lang="en-CA" dirty="0" smtClean="0">
+              <a:rPr lang="en-CA" dirty="0">
                 <a:latin typeface="Consolas" panose="020B0609020204030204" pitchFamily="49" charset="0"/>
               </a:rPr>
               <a:t>")</a:t>
@@ -8710,22 +8763,16 @@
               <a:buNone/>
             </a:pPr>
             <a:r>
-              <a:rPr lang="en-CA" dirty="0" err="1" smtClean="0">
+              <a:rPr lang="en-CA" dirty="0" err="1">
                 <a:latin typeface="Consolas" panose="020B0609020204030204" pitchFamily="49" charset="0"/>
               </a:rPr>
               <a:t>iris_cleaned</a:t>
             </a:r>
             <a:r>
-              <a:rPr lang="en-CA" dirty="0" smtClean="0">
-                <a:latin typeface="Consolas" panose="020B0609020204030204" pitchFamily="49" charset="0"/>
-              </a:rPr>
-              <a:t> </a:t>
-            </a:r>
-            <a:r>
               <a:rPr lang="en-CA" dirty="0">
                 <a:latin typeface="Consolas" panose="020B0609020204030204" pitchFamily="49" charset="0"/>
               </a:rPr>
-              <a:t>&lt;- select(</a:t>
+              <a:t> &lt;- select(</a:t>
             </a:r>
             <a:r>
               <a:rPr lang="en-CA" dirty="0" err="1">
@@ -8746,14 +8793,11 @@
               <a:t>Sepal.Length</a:t>
             </a:r>
             <a:r>
-              <a:rPr lang="en-CA" dirty="0" smtClean="0">
+              <a:rPr lang="en-CA" dirty="0">
                 <a:latin typeface="Consolas" panose="020B0609020204030204" pitchFamily="49" charset="0"/>
               </a:rPr>
               <a:t>)</a:t>
             </a:r>
-            <a:endParaRPr lang="en-CA" dirty="0">
-              <a:latin typeface="Consolas" panose="020B0609020204030204" pitchFamily="49" charset="0"/>
-            </a:endParaRPr>
           </a:p>
         </p:txBody>
       </p:sp>
@@ -8803,10 +8847,9 @@
           <a:lstStyle/>
           <a:p>
             <a:r>
-              <a:rPr lang="en-CA" dirty="0" smtClean="0"/>
+              <a:rPr lang="en-CA" dirty="0"/>
               <a:t>Data Pipe (%&gt;%)</a:t>
             </a:r>
-            <a:endParaRPr lang="en-CA" dirty="0"/>
           </a:p>
         </p:txBody>
       </p:sp>
@@ -9009,14 +9052,11 @@
               <a:t>Sepal.Length</a:t>
             </a:r>
             <a:r>
-              <a:rPr lang="en-CA" dirty="0" smtClean="0">
+              <a:rPr lang="en-CA" dirty="0">
                 <a:latin typeface="Consolas" panose="020B0609020204030204" pitchFamily="49" charset="0"/>
               </a:rPr>
               <a:t>)</a:t>
             </a:r>
-            <a:endParaRPr lang="en-CA" dirty="0">
-              <a:latin typeface="Consolas" panose="020B0609020204030204" pitchFamily="49" charset="0"/>
-            </a:endParaRPr>
           </a:p>
         </p:txBody>
       </p:sp>
@@ -9066,10 +9106,9 @@
           <a:lstStyle/>
           <a:p>
             <a:r>
-              <a:rPr lang="en-CA" dirty="0" smtClean="0"/>
+              <a:rPr lang="en-CA" dirty="0"/>
               <a:t>Data Pipe (%&gt;%)</a:t>
             </a:r>
-            <a:endParaRPr lang="en-CA" dirty="0"/>
           </a:p>
         </p:txBody>
       </p:sp>
@@ -9172,22 +9211,16 @@
               <a:buNone/>
             </a:pPr>
             <a:r>
-              <a:rPr lang="en-CA" dirty="0" err="1" smtClean="0">
+              <a:rPr lang="en-CA" dirty="0" err="1">
                 <a:latin typeface="Consolas" panose="020B0609020204030204" pitchFamily="49" charset="0"/>
               </a:rPr>
               <a:t>iris_cleaned</a:t>
             </a:r>
             <a:r>
-              <a:rPr lang="en-CA" dirty="0" smtClean="0">
-                <a:latin typeface="Consolas" panose="020B0609020204030204" pitchFamily="49" charset="0"/>
-              </a:rPr>
-              <a:t> </a:t>
-            </a:r>
-            <a:r>
               <a:rPr lang="en-CA" dirty="0">
                 <a:latin typeface="Consolas" panose="020B0609020204030204" pitchFamily="49" charset="0"/>
               </a:rPr>
-              <a:t>&lt;- iris </a:t>
+              <a:t> &lt;- iris </a:t>
             </a:r>
             <a:r>
               <a:rPr lang="en-CA" b="1" dirty="0">

</xml_diff>